<commit_message>
save config for iw
</commit_message>
<xml_diff>
--- a/documents/presentations/ELSeWeb-Presentation-v1.pptx
+++ b/documents/presentations/ELSeWeb-Presentation-v1.pptx
@@ -5,15 +5,13 @@
     <p:sldMasterId id="2147483648" r:id="rId1"/>
   </p:sldMasterIdLst>
   <p:notesMasterIdLst>
-    <p:notesMasterId r:id="rId8"/>
+    <p:notesMasterId r:id="rId6"/>
   </p:notesMasterIdLst>
   <p:sldIdLst>
     <p:sldId id="258" r:id="rId2"/>
     <p:sldId id="256" r:id="rId3"/>
-    <p:sldId id="265" r:id="rId4"/>
-    <p:sldId id="264" r:id="rId5"/>
-    <p:sldId id="262" r:id="rId6"/>
-    <p:sldId id="263" r:id="rId7"/>
+    <p:sldId id="262" r:id="rId4"/>
+    <p:sldId id="263" r:id="rId5"/>
   </p:sldIdLst>
   <p:sldSz cx="9144000" cy="6858000" type="screen4x3"/>
   <p:notesSz cx="6858000" cy="9144000"/>
@@ -197,7 +195,7 @@
           <a:p>
             <a:fld id="{76D251C5-7F87-4E01-A67A-06FBD005017F}" type="datetimeFigureOut">
               <a:rPr lang="en-US" smtClean="0"/>
-              <a:t>3/5/2013</a:t>
+              <a:t>4/22/2013</a:t>
             </a:fld>
             <a:endParaRPr lang="en-US"/>
           </a:p>
@@ -647,7 +645,7 @@
             <a:fld id="{F26C4FE1-3CB3-450F-A0E0-0FC724B8C09E}" type="datetimeFigureOut">
               <a:rPr lang="en-US" smtClean="0"/>
               <a:pPr/>
-              <a:t>3/5/2013</a:t>
+              <a:t>4/22/2013</a:t>
             </a:fld>
             <a:endParaRPr lang="en-US"/>
           </a:p>
@@ -814,7 +812,7 @@
             <a:fld id="{F26C4FE1-3CB3-450F-A0E0-0FC724B8C09E}" type="datetimeFigureOut">
               <a:rPr lang="en-US" smtClean="0"/>
               <a:pPr/>
-              <a:t>3/5/2013</a:t>
+              <a:t>4/22/2013</a:t>
             </a:fld>
             <a:endParaRPr lang="en-US"/>
           </a:p>
@@ -991,7 +989,7 @@
             <a:fld id="{F26C4FE1-3CB3-450F-A0E0-0FC724B8C09E}" type="datetimeFigureOut">
               <a:rPr lang="en-US" smtClean="0"/>
               <a:pPr/>
-              <a:t>3/5/2013</a:t>
+              <a:t>4/22/2013</a:t>
             </a:fld>
             <a:endParaRPr lang="en-US"/>
           </a:p>
@@ -1158,7 +1156,7 @@
             <a:fld id="{F26C4FE1-3CB3-450F-A0E0-0FC724B8C09E}" type="datetimeFigureOut">
               <a:rPr lang="en-US" smtClean="0"/>
               <a:pPr/>
-              <a:t>3/5/2013</a:t>
+              <a:t>4/22/2013</a:t>
             </a:fld>
             <a:endParaRPr lang="en-US"/>
           </a:p>
@@ -1401,7 +1399,7 @@
             <a:fld id="{F26C4FE1-3CB3-450F-A0E0-0FC724B8C09E}" type="datetimeFigureOut">
               <a:rPr lang="en-US" smtClean="0"/>
               <a:pPr/>
-              <a:t>3/5/2013</a:t>
+              <a:t>4/22/2013</a:t>
             </a:fld>
             <a:endParaRPr lang="en-US"/>
           </a:p>
@@ -1686,7 +1684,7 @@
             <a:fld id="{F26C4FE1-3CB3-450F-A0E0-0FC724B8C09E}" type="datetimeFigureOut">
               <a:rPr lang="en-US" smtClean="0"/>
               <a:pPr/>
-              <a:t>3/5/2013</a:t>
+              <a:t>4/22/2013</a:t>
             </a:fld>
             <a:endParaRPr lang="en-US"/>
           </a:p>
@@ -2105,7 +2103,7 @@
             <a:fld id="{F26C4FE1-3CB3-450F-A0E0-0FC724B8C09E}" type="datetimeFigureOut">
               <a:rPr lang="en-US" smtClean="0"/>
               <a:pPr/>
-              <a:t>3/5/2013</a:t>
+              <a:t>4/22/2013</a:t>
             </a:fld>
             <a:endParaRPr lang="en-US"/>
           </a:p>
@@ -2220,7 +2218,7 @@
             <a:fld id="{F26C4FE1-3CB3-450F-A0E0-0FC724B8C09E}" type="datetimeFigureOut">
               <a:rPr lang="en-US" smtClean="0"/>
               <a:pPr/>
-              <a:t>3/5/2013</a:t>
+              <a:t>4/22/2013</a:t>
             </a:fld>
             <a:endParaRPr lang="en-US"/>
           </a:p>
@@ -2312,7 +2310,7 @@
             <a:fld id="{F26C4FE1-3CB3-450F-A0E0-0FC724B8C09E}" type="datetimeFigureOut">
               <a:rPr lang="en-US" smtClean="0"/>
               <a:pPr/>
-              <a:t>3/5/2013</a:t>
+              <a:t>4/22/2013</a:t>
             </a:fld>
             <a:endParaRPr lang="en-US"/>
           </a:p>
@@ -2586,7 +2584,7 @@
             <a:fld id="{F26C4FE1-3CB3-450F-A0E0-0FC724B8C09E}" type="datetimeFigureOut">
               <a:rPr lang="en-US" smtClean="0"/>
               <a:pPr/>
-              <a:t>3/5/2013</a:t>
+              <a:t>4/22/2013</a:t>
             </a:fld>
             <a:endParaRPr lang="en-US"/>
           </a:p>
@@ -2836,7 +2834,7 @@
             <a:fld id="{F26C4FE1-3CB3-450F-A0E0-0FC724B8C09E}" type="datetimeFigureOut">
               <a:rPr lang="en-US" smtClean="0"/>
               <a:pPr/>
-              <a:t>3/5/2013</a:t>
+              <a:t>4/22/2013</a:t>
             </a:fld>
             <a:endParaRPr lang="en-US"/>
           </a:p>
@@ -3046,7 +3044,7 @@
             <a:fld id="{F26C4FE1-3CB3-450F-A0E0-0FC724B8C09E}" type="datetimeFigureOut">
               <a:rPr lang="en-US" smtClean="0"/>
               <a:pPr/>
-              <a:t>3/5/2013</a:t>
+              <a:t>4/22/2013</a:t>
             </a:fld>
             <a:endParaRPr lang="en-US"/>
           </a:p>
@@ -6173,2854 +6171,6 @@
           <a:chExt cx="0" cy="0"/>
         </a:xfrm>
       </p:grpSpPr>
-      <p:grpSp>
-        <p:nvGrpSpPr>
-          <p:cNvPr id="70" name="Group 69"/>
-          <p:cNvGrpSpPr/>
-          <p:nvPr/>
-        </p:nvGrpSpPr>
-        <p:grpSpPr>
-          <a:xfrm>
-            <a:off x="304800" y="152400"/>
-            <a:ext cx="2590800" cy="4724400"/>
-            <a:chOff x="1904988" y="0"/>
-            <a:chExt cx="1776263" cy="452956"/>
-          </a:xfrm>
-        </p:grpSpPr>
-        <p:sp>
-          <p:nvSpPr>
-            <p:cNvPr id="71" name="Rounded Rectangle 70"/>
-            <p:cNvSpPr/>
-            <p:nvPr/>
-          </p:nvSpPr>
-          <p:spPr>
-            <a:xfrm>
-              <a:off x="1904988" y="0"/>
-              <a:ext cx="1776263" cy="452956"/>
-            </a:xfrm>
-            <a:prstGeom prst="roundRect">
-              <a:avLst>
-                <a:gd name="adj" fmla="val 10000"/>
-              </a:avLst>
-            </a:prstGeom>
-            <a:solidFill>
-              <a:schemeClr val="accent4"/>
-            </a:solidFill>
-          </p:spPr>
-          <p:style>
-            <a:lnRef idx="2">
-              <a:schemeClr val="lt1">
-                <a:hueOff val="0"/>
-                <a:satOff val="0"/>
-                <a:lumOff val="0"/>
-                <a:alphaOff val="0"/>
-              </a:schemeClr>
-            </a:lnRef>
-            <a:fillRef idx="1">
-              <a:scrgbClr r="0" g="0" b="0"/>
-            </a:fillRef>
-            <a:effectRef idx="0">
-              <a:schemeClr val="accent1">
-                <a:hueOff val="0"/>
-                <a:satOff val="0"/>
-                <a:lumOff val="0"/>
-                <a:alphaOff val="0"/>
-              </a:schemeClr>
-            </a:effectRef>
-            <a:fontRef idx="minor">
-              <a:schemeClr val="lt1"/>
-            </a:fontRef>
-          </p:style>
-        </p:sp>
-        <p:sp>
-          <p:nvSpPr>
-            <p:cNvPr id="72" name="Rounded Rectangle 4"/>
-            <p:cNvSpPr/>
-            <p:nvPr/>
-          </p:nvSpPr>
-          <p:spPr>
-            <a:xfrm>
-              <a:off x="1918255" y="13267"/>
-              <a:ext cx="1749729" cy="426422"/>
-            </a:xfrm>
-            <a:prstGeom prst="rect">
-              <a:avLst/>
-            </a:prstGeom>
-          </p:spPr>
-          <p:style>
-            <a:lnRef idx="0">
-              <a:scrgbClr r="0" g="0" b="0"/>
-            </a:lnRef>
-            <a:fillRef idx="0">
-              <a:scrgbClr r="0" g="0" b="0"/>
-            </a:fillRef>
-            <a:effectRef idx="0">
-              <a:scrgbClr r="0" g="0" b="0"/>
-            </a:effectRef>
-            <a:fontRef idx="minor">
-              <a:schemeClr val="lt1"/>
-            </a:fontRef>
-          </p:style>
-          <p:txBody>
-            <a:bodyPr spcFirstLastPara="0" vert="horz" wrap="square" lIns="53340" tIns="53340" rIns="53340" bIns="53340" numCol="1" spcCol="1270" anchor="b" anchorCtr="0">
-              <a:noAutofit/>
-            </a:bodyPr>
-            <a:lstStyle/>
-            <a:p>
-              <a:pPr lvl="0" algn="ctr" defTabSz="622300">
-                <a:lnSpc>
-                  <a:spcPct val="90000"/>
-                </a:lnSpc>
-                <a:spcBef>
-                  <a:spcPct val="0"/>
-                </a:spcBef>
-                <a:spcAft>
-                  <a:spcPct val="35000"/>
-                </a:spcAft>
-              </a:pPr>
-              <a:r>
-                <a:rPr lang="en-US" b="1" dirty="0" smtClean="0"/>
-                <a:t>Knowledge </a:t>
-              </a:r>
-              <a:r>
-                <a:rPr lang="en-US" b="1" dirty="0"/>
-                <a:t>B</a:t>
-              </a:r>
-              <a:r>
-                <a:rPr lang="en-US" b="1" dirty="0" smtClean="0"/>
-                <a:t>ase</a:t>
-              </a:r>
-              <a:endParaRPr lang="en-US" b="1" kern="1200" dirty="0" smtClean="0"/>
-            </a:p>
-          </p:txBody>
-        </p:sp>
-      </p:grpSp>
-      <p:grpSp>
-        <p:nvGrpSpPr>
-          <p:cNvPr id="82" name="Group 81"/>
-          <p:cNvGrpSpPr/>
-          <p:nvPr/>
-        </p:nvGrpSpPr>
-        <p:grpSpPr>
-          <a:xfrm>
-            <a:off x="468582" y="533259"/>
-            <a:ext cx="2110834" cy="1706209"/>
-            <a:chOff x="460176" y="1500926"/>
-            <a:chExt cx="2110834" cy="1551099"/>
-          </a:xfrm>
-        </p:grpSpPr>
-        <p:sp>
-          <p:nvSpPr>
-            <p:cNvPr id="50" name="Rounded Rectangle 4"/>
-            <p:cNvSpPr/>
-            <p:nvPr/>
-          </p:nvSpPr>
-          <p:spPr>
-            <a:xfrm>
-              <a:off x="460176" y="1500926"/>
-              <a:ext cx="1501234" cy="789099"/>
-            </a:xfrm>
-            <a:prstGeom prst="rect">
-              <a:avLst/>
-            </a:prstGeom>
-            <a:solidFill>
-              <a:schemeClr val="bg1"/>
-            </a:solidFill>
-            <a:ln w="22225">
-              <a:solidFill>
-                <a:schemeClr val="tx1"/>
-              </a:solidFill>
-            </a:ln>
-          </p:spPr>
-          <p:style>
-            <a:lnRef idx="0">
-              <a:scrgbClr r="0" g="0" b="0"/>
-            </a:lnRef>
-            <a:fillRef idx="0">
-              <a:scrgbClr r="0" g="0" b="0"/>
-            </a:fillRef>
-            <a:effectRef idx="0">
-              <a:scrgbClr r="0" g="0" b="0"/>
-            </a:effectRef>
-            <a:fontRef idx="minor">
-              <a:schemeClr val="lt1"/>
-            </a:fontRef>
-          </p:style>
-          <p:txBody>
-            <a:bodyPr spcFirstLastPara="0" vert="horz" wrap="square" lIns="53340" tIns="53340" rIns="53340" bIns="53340" numCol="1" spcCol="1270" anchor="t" anchorCtr="0">
-              <a:noAutofit/>
-            </a:bodyPr>
-            <a:lstStyle/>
-            <a:p>
-              <a:pPr lvl="0" algn="ctr" defTabSz="622300">
-                <a:lnSpc>
-                  <a:spcPct val="90000"/>
-                </a:lnSpc>
-                <a:spcBef>
-                  <a:spcPct val="0"/>
-                </a:spcBef>
-                <a:spcAft>
-                  <a:spcPct val="35000"/>
-                </a:spcAft>
-              </a:pPr>
-              <a:r>
-                <a:rPr lang="en-US" sz="1600" b="1" dirty="0" err="1" smtClean="0">
-                  <a:solidFill>
-                    <a:schemeClr val="tx1"/>
-                  </a:solidFill>
-                </a:rPr>
-                <a:t>Experiment.owl</a:t>
-              </a:r>
-              <a:endParaRPr lang="en-US" b="1" kern="1200" dirty="0" smtClean="0">
-                <a:solidFill>
-                  <a:schemeClr val="tx1"/>
-                </a:solidFill>
-              </a:endParaRPr>
-            </a:p>
-          </p:txBody>
-        </p:sp>
-        <p:sp>
-          <p:nvSpPr>
-            <p:cNvPr id="59" name="Rounded Rectangle 4"/>
-            <p:cNvSpPr/>
-            <p:nvPr/>
-          </p:nvSpPr>
-          <p:spPr>
-            <a:xfrm>
-              <a:off x="688776" y="1881926"/>
-              <a:ext cx="1501234" cy="789099"/>
-            </a:xfrm>
-            <a:prstGeom prst="rect">
-              <a:avLst/>
-            </a:prstGeom>
-            <a:solidFill>
-              <a:schemeClr val="bg1"/>
-            </a:solidFill>
-            <a:ln w="22225">
-              <a:solidFill>
-                <a:schemeClr val="tx1"/>
-              </a:solidFill>
-            </a:ln>
-          </p:spPr>
-          <p:style>
-            <a:lnRef idx="0">
-              <a:scrgbClr r="0" g="0" b="0"/>
-            </a:lnRef>
-            <a:fillRef idx="0">
-              <a:scrgbClr r="0" g="0" b="0"/>
-            </a:fillRef>
-            <a:effectRef idx="0">
-              <a:scrgbClr r="0" g="0" b="0"/>
-            </a:effectRef>
-            <a:fontRef idx="minor">
-              <a:schemeClr val="lt1"/>
-            </a:fontRef>
-          </p:style>
-          <p:txBody>
-            <a:bodyPr spcFirstLastPara="0" vert="horz" wrap="square" lIns="53340" tIns="53340" rIns="53340" bIns="53340" numCol="1" spcCol="1270" anchor="t" anchorCtr="0">
-              <a:noAutofit/>
-            </a:bodyPr>
-            <a:lstStyle/>
-            <a:p>
-              <a:pPr lvl="0" algn="ctr" defTabSz="622300">
-                <a:lnSpc>
-                  <a:spcPct val="90000"/>
-                </a:lnSpc>
-                <a:spcBef>
-                  <a:spcPct val="0"/>
-                </a:spcBef>
-                <a:spcAft>
-                  <a:spcPct val="35000"/>
-                </a:spcAft>
-              </a:pPr>
-              <a:r>
-                <a:rPr lang="en-US" sz="1600" b="1" dirty="0" err="1" smtClean="0">
-                  <a:solidFill>
-                    <a:schemeClr val="tx1"/>
-                  </a:solidFill>
-                </a:rPr>
-                <a:t>Experiment.owl</a:t>
-              </a:r>
-              <a:endParaRPr lang="en-US" b="1" kern="1200" dirty="0" smtClean="0">
-                <a:solidFill>
-                  <a:schemeClr val="tx1"/>
-                </a:solidFill>
-              </a:endParaRPr>
-            </a:p>
-          </p:txBody>
-        </p:sp>
-        <p:sp>
-          <p:nvSpPr>
-            <p:cNvPr id="62" name="Rounded Rectangle 4"/>
-            <p:cNvSpPr/>
-            <p:nvPr/>
-          </p:nvSpPr>
-          <p:spPr>
-            <a:xfrm>
-              <a:off x="1069776" y="2262926"/>
-              <a:ext cx="1501234" cy="789099"/>
-            </a:xfrm>
-            <a:prstGeom prst="rect">
-              <a:avLst/>
-            </a:prstGeom>
-            <a:solidFill>
-              <a:schemeClr val="bg1"/>
-            </a:solidFill>
-            <a:ln w="22225">
-              <a:solidFill>
-                <a:schemeClr val="tx1"/>
-              </a:solidFill>
-            </a:ln>
-          </p:spPr>
-          <p:style>
-            <a:lnRef idx="0">
-              <a:scrgbClr r="0" g="0" b="0"/>
-            </a:lnRef>
-            <a:fillRef idx="0">
-              <a:scrgbClr r="0" g="0" b="0"/>
-            </a:fillRef>
-            <a:effectRef idx="0">
-              <a:scrgbClr r="0" g="0" b="0"/>
-            </a:effectRef>
-            <a:fontRef idx="minor">
-              <a:schemeClr val="lt1"/>
-            </a:fontRef>
-          </p:style>
-          <p:txBody>
-            <a:bodyPr spcFirstLastPara="0" vert="horz" wrap="square" lIns="53340" tIns="53340" rIns="53340" bIns="53340" numCol="1" spcCol="1270" anchor="t" anchorCtr="0">
-              <a:noAutofit/>
-            </a:bodyPr>
-            <a:lstStyle/>
-            <a:p>
-              <a:pPr lvl="0" algn="ctr" defTabSz="622300">
-                <a:lnSpc>
-                  <a:spcPct val="90000"/>
-                </a:lnSpc>
-                <a:spcBef>
-                  <a:spcPct val="0"/>
-                </a:spcBef>
-                <a:spcAft>
-                  <a:spcPct val="35000"/>
-                </a:spcAft>
-              </a:pPr>
-              <a:r>
-                <a:rPr lang="en-US" sz="1600" b="1" dirty="0" err="1" smtClean="0">
-                  <a:solidFill>
-                    <a:schemeClr val="tx1"/>
-                  </a:solidFill>
-                </a:rPr>
-                <a:t>Experiment.owl</a:t>
-              </a:r>
-              <a:endParaRPr lang="en-US" b="1" kern="1200" dirty="0" smtClean="0">
-                <a:solidFill>
-                  <a:schemeClr val="tx1"/>
-                </a:solidFill>
-              </a:endParaRPr>
-            </a:p>
-          </p:txBody>
-        </p:sp>
-      </p:grpSp>
-      <p:pic>
-        <p:nvPicPr>
-          <p:cNvPr id="1026" name="Picture 2"/>
-          <p:cNvPicPr>
-            <a:picLocks noChangeAspect="1" noChangeArrowheads="1"/>
-          </p:cNvPicPr>
-          <p:nvPr/>
-        </p:nvPicPr>
-        <p:blipFill>
-          <a:blip r:embed="rId2">
-            <a:extLst>
-              <a:ext uri="{28A0092B-C50C-407E-A947-70E740481C1C}">
-                <a14:useLocalDpi xmlns:a14="http://schemas.microsoft.com/office/drawing/2010/main" val="0"/>
-              </a:ext>
-            </a:extLst>
-          </a:blip>
-          <a:srcRect/>
-          <a:stretch>
-            <a:fillRect/>
-          </a:stretch>
-        </p:blipFill>
-        <p:spPr bwMode="auto">
-          <a:xfrm>
-            <a:off x="6104406" y="160697"/>
-            <a:ext cx="2819400" cy="2521126"/>
-          </a:xfrm>
-          <a:prstGeom prst="rect">
-            <a:avLst/>
-          </a:prstGeom>
-          <a:noFill/>
-          <a:ln>
-            <a:noFill/>
-          </a:ln>
-          <a:extLst>
-            <a:ext uri="{909E8E84-426E-40DD-AFC4-6F175D3DCCD1}">
-              <a14:hiddenFill xmlns:a14="http://schemas.microsoft.com/office/drawing/2010/main">
-                <a:solidFill>
-                  <a:schemeClr val="accent1"/>
-                </a:solidFill>
-              </a14:hiddenFill>
-            </a:ext>
-            <a:ext uri="{91240B29-F687-4F45-9708-019B960494DF}">
-              <a14:hiddenLine xmlns:a14="http://schemas.microsoft.com/office/drawing/2010/main" w="9525">
-                <a:solidFill>
-                  <a:schemeClr val="tx1"/>
-                </a:solidFill>
-                <a:miter lim="800000"/>
-                <a:headEnd/>
-                <a:tailEnd/>
-              </a14:hiddenLine>
-            </a:ext>
-          </a:extLst>
-        </p:spPr>
-      </p:pic>
-      <p:sp>
-        <p:nvSpPr>
-          <p:cNvPr id="78" name="Rounded Rectangle 4"/>
-          <p:cNvSpPr/>
-          <p:nvPr/>
-        </p:nvSpPr>
-        <p:spPr>
-          <a:xfrm>
-            <a:off x="1071832" y="2895599"/>
-            <a:ext cx="1501234" cy="868009"/>
-          </a:xfrm>
-          <a:prstGeom prst="rect">
-            <a:avLst/>
-          </a:prstGeom>
-          <a:solidFill>
-            <a:schemeClr val="bg1"/>
-          </a:solidFill>
-          <a:ln w="22225">
-            <a:solidFill>
-              <a:schemeClr val="tx1"/>
-            </a:solidFill>
-          </a:ln>
-        </p:spPr>
-        <p:style>
-          <a:lnRef idx="0">
-            <a:scrgbClr r="0" g="0" b="0"/>
-          </a:lnRef>
-          <a:fillRef idx="0">
-            <a:scrgbClr r="0" g="0" b="0"/>
-          </a:fillRef>
-          <a:effectRef idx="0">
-            <a:scrgbClr r="0" g="0" b="0"/>
-          </a:effectRef>
-          <a:fontRef idx="minor">
-            <a:schemeClr val="lt1"/>
-          </a:fontRef>
-        </p:style>
-        <p:txBody>
-          <a:bodyPr spcFirstLastPara="0" vert="horz" wrap="square" lIns="53340" tIns="53340" rIns="53340" bIns="53340" numCol="1" spcCol="1270" anchor="t" anchorCtr="0">
-            <a:noAutofit/>
-          </a:bodyPr>
-          <a:lstStyle/>
-          <a:p>
-            <a:pPr lvl="0" algn="ctr" defTabSz="622300">
-              <a:lnSpc>
-                <a:spcPct val="90000"/>
-              </a:lnSpc>
-              <a:spcBef>
-                <a:spcPct val="0"/>
-              </a:spcBef>
-              <a:spcAft>
-                <a:spcPct val="35000"/>
-              </a:spcAft>
-            </a:pPr>
-            <a:r>
-              <a:rPr lang="en-US" sz="1600" b="1" dirty="0" err="1">
-                <a:solidFill>
-                  <a:schemeClr val="tx1"/>
-                </a:solidFill>
-              </a:rPr>
-              <a:t>L</a:t>
-            </a:r>
-            <a:r>
-              <a:rPr lang="en-US" sz="1600" b="1" dirty="0" err="1" smtClean="0">
-                <a:solidFill>
-                  <a:schemeClr val="tx1"/>
-                </a:solidFill>
-              </a:rPr>
-              <a:t>ifemapper.owl</a:t>
-            </a:r>
-            <a:endParaRPr lang="en-US" b="1" kern="1200" dirty="0" smtClean="0">
-              <a:solidFill>
-                <a:schemeClr val="tx1"/>
-              </a:solidFill>
-            </a:endParaRPr>
-          </a:p>
-        </p:txBody>
-      </p:sp>
-      <p:sp>
-        <p:nvSpPr>
-          <p:cNvPr id="75" name="Rounded Rectangle 4"/>
-          <p:cNvSpPr/>
-          <p:nvPr/>
-        </p:nvSpPr>
-        <p:spPr>
-          <a:xfrm>
-            <a:off x="1250372" y="3276599"/>
-            <a:ext cx="1501234" cy="868009"/>
-          </a:xfrm>
-          <a:prstGeom prst="rect">
-            <a:avLst/>
-          </a:prstGeom>
-          <a:solidFill>
-            <a:schemeClr val="bg1"/>
-          </a:solidFill>
-          <a:ln w="22225">
-            <a:solidFill>
-              <a:schemeClr val="tx1"/>
-            </a:solidFill>
-          </a:ln>
-        </p:spPr>
-        <p:style>
-          <a:lnRef idx="0">
-            <a:scrgbClr r="0" g="0" b="0"/>
-          </a:lnRef>
-          <a:fillRef idx="0">
-            <a:scrgbClr r="0" g="0" b="0"/>
-          </a:fillRef>
-          <a:effectRef idx="0">
-            <a:scrgbClr r="0" g="0" b="0"/>
-          </a:effectRef>
-          <a:fontRef idx="minor">
-            <a:schemeClr val="lt1"/>
-          </a:fontRef>
-        </p:style>
-        <p:txBody>
-          <a:bodyPr spcFirstLastPara="0" vert="horz" wrap="square" lIns="53340" tIns="53340" rIns="53340" bIns="53340" numCol="1" spcCol="1270" anchor="t" anchorCtr="0">
-            <a:noAutofit/>
-          </a:bodyPr>
-          <a:lstStyle/>
-          <a:p>
-            <a:pPr lvl="0" algn="ctr" defTabSz="622300">
-              <a:lnSpc>
-                <a:spcPct val="90000"/>
-              </a:lnSpc>
-              <a:spcBef>
-                <a:spcPct val="0"/>
-              </a:spcBef>
-              <a:spcAft>
-                <a:spcPct val="35000"/>
-              </a:spcAft>
-            </a:pPr>
-            <a:r>
-              <a:rPr lang="en-US" sz="1600" b="1" dirty="0" err="1">
-                <a:solidFill>
-                  <a:schemeClr val="tx1"/>
-                </a:solidFill>
-              </a:rPr>
-              <a:t>E</a:t>
-            </a:r>
-            <a:r>
-              <a:rPr lang="en-US" sz="1600" b="1" dirty="0" err="1" smtClean="0">
-                <a:solidFill>
-                  <a:schemeClr val="tx1"/>
-                </a:solidFill>
-              </a:rPr>
-              <a:t>dac.owl</a:t>
-            </a:r>
-            <a:endParaRPr lang="en-US" b="1" kern="1200" dirty="0" smtClean="0">
-              <a:solidFill>
-                <a:schemeClr val="tx1"/>
-              </a:solidFill>
-            </a:endParaRPr>
-          </a:p>
-        </p:txBody>
-      </p:sp>
-      <p:sp>
-        <p:nvSpPr>
-          <p:cNvPr id="68" name="TextBox 67"/>
-          <p:cNvSpPr txBox="1"/>
-          <p:nvPr/>
-        </p:nvSpPr>
-        <p:spPr>
-          <a:xfrm>
-            <a:off x="922806" y="2362199"/>
-            <a:ext cx="1040511" cy="372409"/>
-          </a:xfrm>
-          <a:prstGeom prst="rect">
-            <a:avLst/>
-          </a:prstGeom>
-          <a:noFill/>
-        </p:spPr>
-        <p:txBody>
-          <a:bodyPr wrap="square" rtlCol="0">
-            <a:spAutoFit/>
-          </a:bodyPr>
-          <a:lstStyle/>
-          <a:p>
-            <a:r>
-              <a:rPr lang="en-US" sz="1600" b="1" dirty="0" smtClean="0"/>
-              <a:t>imports</a:t>
-            </a:r>
-            <a:endParaRPr lang="en-US" sz="1600" b="1" dirty="0"/>
-          </a:p>
-        </p:txBody>
-      </p:sp>
-      <p:cxnSp>
-        <p:nvCxnSpPr>
-          <p:cNvPr id="81" name="Straight Arrow Connector 80"/>
-          <p:cNvCxnSpPr>
-            <a:stCxn id="62" idx="2"/>
-            <a:endCxn id="78" idx="0"/>
-          </p:cNvCxnSpPr>
-          <p:nvPr/>
-        </p:nvCxnSpPr>
-        <p:spPr>
-          <a:xfrm flipH="1">
-            <a:off x="1822449" y="2239468"/>
-            <a:ext cx="6350" cy="656131"/>
-          </a:xfrm>
-          <a:prstGeom prst="straightConnector1">
-            <a:avLst/>
-          </a:prstGeom>
-          <a:ln w="31750">
-            <a:solidFill>
-              <a:schemeClr val="tx1"/>
-            </a:solidFill>
-            <a:tailEnd type="triangle" w="lg" len="med"/>
-          </a:ln>
-        </p:spPr>
-        <p:style>
-          <a:lnRef idx="1">
-            <a:schemeClr val="accent1"/>
-          </a:lnRef>
-          <a:fillRef idx="0">
-            <a:schemeClr val="accent1"/>
-          </a:fillRef>
-          <a:effectRef idx="0">
-            <a:schemeClr val="accent1"/>
-          </a:effectRef>
-          <a:fontRef idx="minor">
-            <a:schemeClr val="tx1"/>
-          </a:fontRef>
-        </p:style>
-      </p:cxnSp>
-      <p:sp>
-        <p:nvSpPr>
-          <p:cNvPr id="92" name="Rounded Rectangle 4"/>
-          <p:cNvSpPr/>
-          <p:nvPr/>
-        </p:nvSpPr>
-        <p:spPr>
-          <a:xfrm>
-            <a:off x="6660572" y="3886199"/>
-            <a:ext cx="1501234" cy="789099"/>
-          </a:xfrm>
-          <a:prstGeom prst="rect">
-            <a:avLst/>
-          </a:prstGeom>
-          <a:solidFill>
-            <a:schemeClr val="bg1"/>
-          </a:solidFill>
-          <a:ln w="22225">
-            <a:solidFill>
-              <a:schemeClr val="tx1"/>
-            </a:solidFill>
-          </a:ln>
-        </p:spPr>
-        <p:style>
-          <a:lnRef idx="0">
-            <a:scrgbClr r="0" g="0" b="0"/>
-          </a:lnRef>
-          <a:fillRef idx="0">
-            <a:scrgbClr r="0" g="0" b="0"/>
-          </a:fillRef>
-          <a:effectRef idx="0">
-            <a:scrgbClr r="0" g="0" b="0"/>
-          </a:effectRef>
-          <a:fontRef idx="minor">
-            <a:schemeClr val="lt1"/>
-          </a:fontRef>
-        </p:style>
-        <p:txBody>
-          <a:bodyPr spcFirstLastPara="0" vert="horz" wrap="square" lIns="53340" tIns="53340" rIns="53340" bIns="53340" numCol="1" spcCol="1270" anchor="t" anchorCtr="0">
-            <a:noAutofit/>
-          </a:bodyPr>
-          <a:lstStyle/>
-          <a:p>
-            <a:pPr lvl="0" algn="ctr" defTabSz="622300">
-              <a:lnSpc>
-                <a:spcPct val="90000"/>
-              </a:lnSpc>
-              <a:spcBef>
-                <a:spcPct val="0"/>
-              </a:spcBef>
-              <a:spcAft>
-                <a:spcPct val="35000"/>
-              </a:spcAft>
-            </a:pPr>
-            <a:r>
-              <a:rPr lang="en-US" sz="1600" b="1" dirty="0" err="1" smtClean="0">
-                <a:solidFill>
-                  <a:schemeClr val="tx1"/>
-                </a:solidFill>
-              </a:rPr>
-              <a:t>Query.rq</a:t>
-            </a:r>
-            <a:endParaRPr lang="en-US" b="1" kern="1200" dirty="0" smtClean="0">
-              <a:solidFill>
-                <a:schemeClr val="tx1"/>
-              </a:solidFill>
-            </a:endParaRPr>
-          </a:p>
-        </p:txBody>
-      </p:sp>
-      <p:sp>
-        <p:nvSpPr>
-          <p:cNvPr id="91" name="TextBox 90"/>
-          <p:cNvSpPr txBox="1"/>
-          <p:nvPr/>
-        </p:nvSpPr>
-        <p:spPr>
-          <a:xfrm>
-            <a:off x="2904006" y="2981980"/>
-            <a:ext cx="2743200" cy="523220"/>
-          </a:xfrm>
-          <a:prstGeom prst="rect">
-            <a:avLst/>
-          </a:prstGeom>
-          <a:noFill/>
-        </p:spPr>
-        <p:txBody>
-          <a:bodyPr wrap="square" rtlCol="0">
-            <a:spAutoFit/>
-          </a:bodyPr>
-          <a:lstStyle/>
-          <a:p>
-            <a:r>
-              <a:rPr lang="en-US" sz="1400" dirty="0" smtClean="0"/>
-              <a:t>Static ontologies used to describe SADI services</a:t>
-            </a:r>
-            <a:endParaRPr lang="en-US" sz="1400" dirty="0"/>
-          </a:p>
-        </p:txBody>
-      </p:sp>
-      <p:sp>
-        <p:nvSpPr>
-          <p:cNvPr id="94" name="TextBox 93"/>
-          <p:cNvSpPr txBox="1"/>
-          <p:nvPr/>
-        </p:nvSpPr>
-        <p:spPr>
-          <a:xfrm>
-            <a:off x="2904006" y="458152"/>
-            <a:ext cx="2743200" cy="523220"/>
-          </a:xfrm>
-          <a:prstGeom prst="rect">
-            <a:avLst/>
-          </a:prstGeom>
-          <a:noFill/>
-        </p:spPr>
-        <p:txBody>
-          <a:bodyPr wrap="square" rtlCol="0">
-            <a:spAutoFit/>
-          </a:bodyPr>
-          <a:lstStyle/>
-          <a:p>
-            <a:r>
-              <a:rPr lang="en-US" sz="1400" dirty="0" smtClean="0"/>
-              <a:t>Dynamic ontologies that describe (constrain) experiments</a:t>
-            </a:r>
-            <a:endParaRPr lang="en-US" sz="1400" dirty="0"/>
-          </a:p>
-        </p:txBody>
-      </p:sp>
-      <p:sp>
-        <p:nvSpPr>
-          <p:cNvPr id="95" name="Right Arrow 94"/>
-          <p:cNvSpPr/>
-          <p:nvPr/>
-        </p:nvSpPr>
-        <p:spPr>
-          <a:xfrm rot="10800000">
-            <a:off x="3086100" y="1095515"/>
-            <a:ext cx="2857500" cy="352284"/>
-          </a:xfrm>
-          <a:prstGeom prst="rightArrow">
-            <a:avLst/>
-          </a:prstGeom>
-          <a:solidFill>
-            <a:schemeClr val="accent4">
-              <a:lumMod val="40000"/>
-              <a:lumOff val="60000"/>
-            </a:schemeClr>
-          </a:solidFill>
-          <a:ln>
-            <a:solidFill>
-              <a:schemeClr val="accent4">
-                <a:lumMod val="40000"/>
-                <a:lumOff val="60000"/>
-              </a:schemeClr>
-            </a:solidFill>
-          </a:ln>
-        </p:spPr>
-        <p:style>
-          <a:lnRef idx="2">
-            <a:schemeClr val="accent1">
-              <a:shade val="50000"/>
-            </a:schemeClr>
-          </a:lnRef>
-          <a:fillRef idx="1">
-            <a:schemeClr val="accent1"/>
-          </a:fillRef>
-          <a:effectRef idx="0">
-            <a:schemeClr val="accent1"/>
-          </a:effectRef>
-          <a:fontRef idx="minor">
-            <a:schemeClr val="lt1"/>
-          </a:fontRef>
-        </p:style>
-        <p:txBody>
-          <a:bodyPr rtlCol="0" anchor="ctr"/>
-          <a:lstStyle/>
-          <a:p>
-            <a:pPr algn="ctr"/>
-            <a:endParaRPr lang="en-US"/>
-          </a:p>
-        </p:txBody>
-      </p:sp>
-      <p:sp>
-        <p:nvSpPr>
-          <p:cNvPr id="96" name="Right Arrow 95"/>
-          <p:cNvSpPr/>
-          <p:nvPr/>
-        </p:nvSpPr>
-        <p:spPr>
-          <a:xfrm rot="5400000">
-            <a:off x="7185425" y="3331894"/>
-            <a:ext cx="451528" cy="352284"/>
-          </a:xfrm>
-          <a:prstGeom prst="rightArrow">
-            <a:avLst/>
-          </a:prstGeom>
-          <a:solidFill>
-            <a:schemeClr val="accent4">
-              <a:lumMod val="40000"/>
-              <a:lumOff val="60000"/>
-            </a:schemeClr>
-          </a:solidFill>
-          <a:ln>
-            <a:solidFill>
-              <a:schemeClr val="accent4">
-                <a:lumMod val="40000"/>
-                <a:lumOff val="60000"/>
-              </a:schemeClr>
-            </a:solidFill>
-          </a:ln>
-        </p:spPr>
-        <p:style>
-          <a:lnRef idx="2">
-            <a:schemeClr val="accent1">
-              <a:shade val="50000"/>
-            </a:schemeClr>
-          </a:lnRef>
-          <a:fillRef idx="1">
-            <a:schemeClr val="accent1"/>
-          </a:fillRef>
-          <a:effectRef idx="0">
-            <a:schemeClr val="accent1"/>
-          </a:effectRef>
-          <a:fontRef idx="minor">
-            <a:schemeClr val="lt1"/>
-          </a:fontRef>
-        </p:style>
-        <p:txBody>
-          <a:bodyPr rtlCol="0" anchor="ctr"/>
-          <a:lstStyle/>
-          <a:p>
-            <a:pPr algn="ctr"/>
-            <a:endParaRPr lang="en-US"/>
-          </a:p>
-        </p:txBody>
-      </p:sp>
-      <p:sp>
-        <p:nvSpPr>
-          <p:cNvPr id="97" name="TextBox 96"/>
-          <p:cNvSpPr txBox="1"/>
-          <p:nvPr/>
-        </p:nvSpPr>
-        <p:spPr>
-          <a:xfrm>
-            <a:off x="4275606" y="4038600"/>
-            <a:ext cx="2438400" cy="523220"/>
-          </a:xfrm>
-          <a:prstGeom prst="rect">
-            <a:avLst/>
-          </a:prstGeom>
-          <a:noFill/>
-        </p:spPr>
-        <p:txBody>
-          <a:bodyPr wrap="square" rtlCol="0">
-            <a:spAutoFit/>
-          </a:bodyPr>
-          <a:lstStyle/>
-          <a:p>
-            <a:r>
-              <a:rPr lang="en-US" sz="1400" dirty="0" smtClean="0"/>
-              <a:t>SPARQL query used </a:t>
-            </a:r>
-            <a:r>
-              <a:rPr lang="en-US" sz="1400" dirty="0" smtClean="0"/>
-              <a:t>to specify what experiment to use</a:t>
-            </a:r>
-            <a:endParaRPr lang="en-US" sz="1400" dirty="0"/>
-          </a:p>
-        </p:txBody>
-      </p:sp>
-      <p:sp>
-        <p:nvSpPr>
-          <p:cNvPr id="99" name="TextBox 98"/>
-          <p:cNvSpPr txBox="1"/>
-          <p:nvPr/>
-        </p:nvSpPr>
-        <p:spPr>
-          <a:xfrm>
-            <a:off x="6104406" y="2677180"/>
-            <a:ext cx="2895600" cy="523220"/>
-          </a:xfrm>
-          <a:prstGeom prst="rect">
-            <a:avLst/>
-          </a:prstGeom>
-          <a:noFill/>
-        </p:spPr>
-        <p:txBody>
-          <a:bodyPr wrap="square" rtlCol="0">
-            <a:spAutoFit/>
-          </a:bodyPr>
-          <a:lstStyle/>
-          <a:p>
-            <a:r>
-              <a:rPr lang="en-US" sz="1400" dirty="0" smtClean="0"/>
-              <a:t>Client that generates experiment constraints and queries </a:t>
-            </a:r>
-            <a:r>
-              <a:rPr lang="en-US" sz="1400" b="1" dirty="0" smtClean="0"/>
-              <a:t>(in progress)</a:t>
-            </a:r>
-            <a:endParaRPr lang="en-US" sz="1400" b="1" dirty="0"/>
-          </a:p>
-        </p:txBody>
-      </p:sp>
-      <p:sp>
-        <p:nvSpPr>
-          <p:cNvPr id="98" name="Right Brace 97"/>
-          <p:cNvSpPr/>
-          <p:nvPr/>
-        </p:nvSpPr>
-        <p:spPr>
-          <a:xfrm rot="5400000" flipV="1">
-            <a:off x="4161305" y="1107876"/>
-            <a:ext cx="454224" cy="7998022"/>
-          </a:xfrm>
-          <a:prstGeom prst="rightBrace">
-            <a:avLst>
-              <a:gd name="adj1" fmla="val 136440"/>
-              <a:gd name="adj2" fmla="val 50000"/>
-            </a:avLst>
-          </a:prstGeom>
-          <a:noFill/>
-          <a:ln>
-            <a:solidFill>
-              <a:schemeClr val="tx1"/>
-            </a:solidFill>
-          </a:ln>
-        </p:spPr>
-        <p:style>
-          <a:lnRef idx="1">
-            <a:schemeClr val="accent1"/>
-          </a:lnRef>
-          <a:fillRef idx="0">
-            <a:schemeClr val="accent1"/>
-          </a:fillRef>
-          <a:effectRef idx="0">
-            <a:schemeClr val="accent1"/>
-          </a:effectRef>
-          <a:fontRef idx="minor">
-            <a:schemeClr val="tx1"/>
-          </a:fontRef>
-        </p:style>
-        <p:txBody>
-          <a:bodyPr rtlCol="0" anchor="ctr"/>
-          <a:lstStyle/>
-          <a:p>
-            <a:pPr algn="ctr"/>
-            <a:endParaRPr lang="en-US"/>
-          </a:p>
-        </p:txBody>
-      </p:sp>
-      <p:sp>
-        <p:nvSpPr>
-          <p:cNvPr id="102" name="TextBox 101"/>
-          <p:cNvSpPr txBox="1"/>
-          <p:nvPr/>
-        </p:nvSpPr>
-        <p:spPr>
-          <a:xfrm>
-            <a:off x="3437406" y="5420380"/>
-            <a:ext cx="2438400" cy="307777"/>
-          </a:xfrm>
-          <a:prstGeom prst="rect">
-            <a:avLst/>
-          </a:prstGeom>
-          <a:noFill/>
-        </p:spPr>
-        <p:txBody>
-          <a:bodyPr wrap="square" rtlCol="0">
-            <a:spAutoFit/>
-          </a:bodyPr>
-          <a:lstStyle/>
-          <a:p>
-            <a:r>
-              <a:rPr lang="en-US" sz="1400" dirty="0" smtClean="0"/>
-              <a:t>Input to </a:t>
-            </a:r>
-            <a:r>
-              <a:rPr lang="en-US" sz="1400" dirty="0" err="1" smtClean="0"/>
-              <a:t>CardioSHARE</a:t>
-            </a:r>
-            <a:endParaRPr lang="en-US" sz="1400" dirty="0"/>
-          </a:p>
-        </p:txBody>
-      </p:sp>
-      <p:sp>
-        <p:nvSpPr>
-          <p:cNvPr id="103" name="Rectangle 102"/>
-          <p:cNvSpPr/>
-          <p:nvPr/>
-        </p:nvSpPr>
-        <p:spPr>
-          <a:xfrm>
-            <a:off x="0" y="5934670"/>
-            <a:ext cx="1714444" cy="923330"/>
-          </a:xfrm>
-          <a:prstGeom prst="rect">
-            <a:avLst/>
-          </a:prstGeom>
-          <a:noFill/>
-        </p:spPr>
-        <p:txBody>
-          <a:bodyPr wrap="none" lIns="91440" tIns="45720" rIns="91440" bIns="45720">
-            <a:spAutoFit/>
-          </a:bodyPr>
-          <a:lstStyle/>
-          <a:p>
-            <a:pPr algn="ctr"/>
-            <a:r>
-              <a:rPr lang="en-US" sz="5400" b="1" cap="none" spc="0" dirty="0" smtClean="0">
-                <a:ln w="31550" cmpd="sng">
-                  <a:gradFill>
-                    <a:gsLst>
-                      <a:gs pos="25000">
-                        <a:schemeClr val="accent1">
-                          <a:shade val="25000"/>
-                          <a:satMod val="190000"/>
-                        </a:schemeClr>
-                      </a:gs>
-                      <a:gs pos="80000">
-                        <a:schemeClr val="accent1">
-                          <a:tint val="75000"/>
-                          <a:satMod val="190000"/>
-                        </a:schemeClr>
-                      </a:gs>
-                    </a:gsLst>
-                    <a:lin ang="5400000"/>
-                  </a:gradFill>
-                  <a:prstDash val="solid"/>
-                </a:ln>
-                <a:solidFill>
-                  <a:srgbClr val="FFFFFF"/>
-                </a:solidFill>
-                <a:effectLst>
-                  <a:outerShdw blurRad="41275" dist="12700" dir="12000000" algn="tl" rotWithShape="0">
-                    <a:srgbClr val="000000">
-                      <a:alpha val="40000"/>
-                    </a:srgbClr>
-                  </a:outerShdw>
-                </a:effectLst>
-              </a:rPr>
-              <a:t>Earth</a:t>
-            </a:r>
-            <a:endParaRPr lang="en-US" sz="5400" b="1" cap="none" spc="0" dirty="0">
-              <a:ln w="31550" cmpd="sng">
-                <a:gradFill>
-                  <a:gsLst>
-                    <a:gs pos="25000">
-                      <a:schemeClr val="accent1">
-                        <a:shade val="25000"/>
-                        <a:satMod val="190000"/>
-                      </a:schemeClr>
-                    </a:gs>
-                    <a:gs pos="80000">
-                      <a:schemeClr val="accent1">
-                        <a:tint val="75000"/>
-                        <a:satMod val="190000"/>
-                      </a:schemeClr>
-                    </a:gs>
-                  </a:gsLst>
-                  <a:lin ang="5400000"/>
-                </a:gradFill>
-                <a:prstDash val="solid"/>
-              </a:ln>
-              <a:solidFill>
-                <a:srgbClr val="FFFFFF"/>
-              </a:solidFill>
-              <a:effectLst>
-                <a:outerShdw blurRad="41275" dist="12700" dir="12000000" algn="tl" rotWithShape="0">
-                  <a:srgbClr val="000000">
-                    <a:alpha val="40000"/>
-                  </a:srgbClr>
-                </a:outerShdw>
-              </a:effectLst>
-            </a:endParaRPr>
-          </a:p>
-        </p:txBody>
-      </p:sp>
-      <p:sp>
-        <p:nvSpPr>
-          <p:cNvPr id="104" name="Rectangle 103"/>
-          <p:cNvSpPr/>
-          <p:nvPr/>
-        </p:nvSpPr>
-        <p:spPr>
-          <a:xfrm>
-            <a:off x="7940785" y="5934670"/>
-            <a:ext cx="1203215" cy="923330"/>
-          </a:xfrm>
-          <a:prstGeom prst="rect">
-            <a:avLst/>
-          </a:prstGeom>
-          <a:noFill/>
-        </p:spPr>
-        <p:txBody>
-          <a:bodyPr wrap="none" lIns="91440" tIns="45720" rIns="91440" bIns="45720">
-            <a:spAutoFit/>
-          </a:bodyPr>
-          <a:lstStyle/>
-          <a:p>
-            <a:pPr algn="ctr"/>
-            <a:r>
-              <a:rPr lang="en-US" sz="5400" b="1" cap="none" spc="0" dirty="0" smtClean="0">
-                <a:ln w="31550" cmpd="sng">
-                  <a:gradFill>
-                    <a:gsLst>
-                      <a:gs pos="25000">
-                        <a:schemeClr val="accent1">
-                          <a:shade val="25000"/>
-                          <a:satMod val="190000"/>
-                        </a:schemeClr>
-                      </a:gs>
-                      <a:gs pos="80000">
-                        <a:schemeClr val="accent1">
-                          <a:tint val="75000"/>
-                          <a:satMod val="190000"/>
-                        </a:schemeClr>
-                      </a:gs>
-                    </a:gsLst>
-                    <a:lin ang="5400000"/>
-                  </a:gradFill>
-                  <a:prstDash val="solid"/>
-                </a:ln>
-                <a:solidFill>
-                  <a:srgbClr val="FFFFFF"/>
-                </a:solidFill>
-                <a:effectLst>
-                  <a:outerShdw blurRad="41275" dist="12700" dir="12000000" algn="tl" rotWithShape="0">
-                    <a:srgbClr val="000000">
-                      <a:alpha val="40000"/>
-                    </a:srgbClr>
-                  </a:outerShdw>
-                </a:effectLst>
-              </a:rPr>
-              <a:t>Life</a:t>
-            </a:r>
-            <a:endParaRPr lang="en-US" sz="5400" b="1" cap="none" spc="0" dirty="0">
-              <a:ln w="31550" cmpd="sng">
-                <a:gradFill>
-                  <a:gsLst>
-                    <a:gs pos="25000">
-                      <a:schemeClr val="accent1">
-                        <a:shade val="25000"/>
-                        <a:satMod val="190000"/>
-                      </a:schemeClr>
-                    </a:gs>
-                    <a:gs pos="80000">
-                      <a:schemeClr val="accent1">
-                        <a:tint val="75000"/>
-                        <a:satMod val="190000"/>
-                      </a:schemeClr>
-                    </a:gs>
-                  </a:gsLst>
-                  <a:lin ang="5400000"/>
-                </a:gradFill>
-                <a:prstDash val="solid"/>
-              </a:ln>
-              <a:solidFill>
-                <a:srgbClr val="FFFFFF"/>
-              </a:solidFill>
-              <a:effectLst>
-                <a:outerShdw blurRad="41275" dist="12700" dir="12000000" algn="tl" rotWithShape="0">
-                  <a:srgbClr val="000000">
-                    <a:alpha val="40000"/>
-                  </a:srgbClr>
-                </a:outerShdw>
-              </a:effectLst>
-            </a:endParaRPr>
-          </a:p>
-        </p:txBody>
-      </p:sp>
-      <p:sp>
-        <p:nvSpPr>
-          <p:cNvPr id="105" name="Rectangle 104"/>
-          <p:cNvSpPr/>
-          <p:nvPr/>
-        </p:nvSpPr>
-        <p:spPr>
-          <a:xfrm>
-            <a:off x="2743200" y="5934670"/>
-            <a:ext cx="4310155" cy="923330"/>
-          </a:xfrm>
-          <a:prstGeom prst="rect">
-            <a:avLst/>
-          </a:prstGeom>
-          <a:noFill/>
-        </p:spPr>
-        <p:txBody>
-          <a:bodyPr wrap="none" lIns="91440" tIns="45720" rIns="91440" bIns="45720">
-            <a:spAutoFit/>
-          </a:bodyPr>
-          <a:lstStyle/>
-          <a:p>
-            <a:pPr algn="ctr"/>
-            <a:r>
-              <a:rPr lang="en-US" sz="5400" b="1" cap="none" spc="0" dirty="0" smtClean="0">
-                <a:ln w="31550" cmpd="sng">
-                  <a:gradFill>
-                    <a:gsLst>
-                      <a:gs pos="25000">
-                        <a:schemeClr val="accent1">
-                          <a:shade val="25000"/>
-                          <a:satMod val="190000"/>
-                        </a:schemeClr>
-                      </a:gs>
-                      <a:gs pos="80000">
-                        <a:schemeClr val="accent1">
-                          <a:tint val="75000"/>
-                          <a:satMod val="190000"/>
-                        </a:schemeClr>
-                      </a:gs>
-                    </a:gsLst>
-                    <a:lin ang="5400000"/>
-                  </a:gradFill>
-                  <a:prstDash val="solid"/>
-                </a:ln>
-                <a:solidFill>
-                  <a:srgbClr val="FFFFFF"/>
-                </a:solidFill>
-                <a:effectLst>
-                  <a:outerShdw blurRad="41275" dist="12700" dir="12000000" algn="tl" rotWithShape="0">
-                    <a:srgbClr val="000000">
-                      <a:alpha val="40000"/>
-                    </a:srgbClr>
-                  </a:outerShdw>
-                </a:effectLst>
-              </a:rPr>
-              <a:t>Semantic Web</a:t>
-            </a:r>
-            <a:endParaRPr lang="en-US" sz="5400" b="1" cap="none" spc="0" dirty="0">
-              <a:ln w="31550" cmpd="sng">
-                <a:gradFill>
-                  <a:gsLst>
-                    <a:gs pos="25000">
-                      <a:schemeClr val="accent1">
-                        <a:shade val="25000"/>
-                        <a:satMod val="190000"/>
-                      </a:schemeClr>
-                    </a:gs>
-                    <a:gs pos="80000">
-                      <a:schemeClr val="accent1">
-                        <a:tint val="75000"/>
-                        <a:satMod val="190000"/>
-                      </a:schemeClr>
-                    </a:gs>
-                  </a:gsLst>
-                  <a:lin ang="5400000"/>
-                </a:gradFill>
-                <a:prstDash val="solid"/>
-              </a:ln>
-              <a:solidFill>
-                <a:srgbClr val="FFFFFF"/>
-              </a:solidFill>
-              <a:effectLst>
-                <a:outerShdw blurRad="41275" dist="12700" dir="12000000" algn="tl" rotWithShape="0">
-                  <a:srgbClr val="000000">
-                    <a:alpha val="40000"/>
-                  </a:srgbClr>
-                </a:outerShdw>
-              </a:effectLst>
-            </a:endParaRPr>
-          </a:p>
-        </p:txBody>
-      </p:sp>
-    </p:spTree>
-    <p:extLst>
-      <p:ext uri="{BB962C8B-B14F-4D97-AF65-F5344CB8AC3E}">
-        <p14:creationId xmlns:p14="http://schemas.microsoft.com/office/powerpoint/2010/main" val="2302962865"/>
-      </p:ext>
-    </p:extLst>
-  </p:cSld>
-  <p:clrMapOvr>
-    <a:masterClrMapping/>
-  </p:clrMapOvr>
-</p:sld>
-</file>
-
-<file path=ppt/slides/slide4.xml><?xml version="1.0" encoding="utf-8"?>
-<p:sld xmlns:a="http://schemas.openxmlformats.org/drawingml/2006/main" xmlns:r="http://schemas.openxmlformats.org/officeDocument/2006/relationships" xmlns:p="http://schemas.openxmlformats.org/presentationml/2006/main">
-  <p:cSld>
-    <p:spTree>
-      <p:nvGrpSpPr>
-        <p:cNvPr id="1" name=""/>
-        <p:cNvGrpSpPr/>
-        <p:nvPr/>
-      </p:nvGrpSpPr>
-      <p:grpSpPr>
-        <a:xfrm>
-          <a:off x="0" y="0"/>
-          <a:ext cx="0" cy="0"/>
-          <a:chOff x="0" y="0"/>
-          <a:chExt cx="0" cy="0"/>
-        </a:xfrm>
-      </p:grpSpPr>
-      <p:sp>
-        <p:nvSpPr>
-          <p:cNvPr id="10" name="Rectangle 9"/>
-          <p:cNvSpPr/>
-          <p:nvPr/>
-        </p:nvSpPr>
-        <p:spPr>
-          <a:xfrm>
-            <a:off x="0" y="5934670"/>
-            <a:ext cx="1714444" cy="923330"/>
-          </a:xfrm>
-          <a:prstGeom prst="rect">
-            <a:avLst/>
-          </a:prstGeom>
-          <a:noFill/>
-        </p:spPr>
-        <p:txBody>
-          <a:bodyPr wrap="none" lIns="91440" tIns="45720" rIns="91440" bIns="45720">
-            <a:spAutoFit/>
-          </a:bodyPr>
-          <a:lstStyle/>
-          <a:p>
-            <a:pPr algn="ctr"/>
-            <a:r>
-              <a:rPr lang="en-US" sz="5400" b="1" cap="none" spc="0" dirty="0" smtClean="0">
-                <a:ln w="31550" cmpd="sng">
-                  <a:gradFill>
-                    <a:gsLst>
-                      <a:gs pos="25000">
-                        <a:schemeClr val="accent1">
-                          <a:shade val="25000"/>
-                          <a:satMod val="190000"/>
-                        </a:schemeClr>
-                      </a:gs>
-                      <a:gs pos="80000">
-                        <a:schemeClr val="accent1">
-                          <a:tint val="75000"/>
-                          <a:satMod val="190000"/>
-                        </a:schemeClr>
-                      </a:gs>
-                    </a:gsLst>
-                    <a:lin ang="5400000"/>
-                  </a:gradFill>
-                  <a:prstDash val="solid"/>
-                </a:ln>
-                <a:solidFill>
-                  <a:srgbClr val="FFFFFF"/>
-                </a:solidFill>
-                <a:effectLst>
-                  <a:outerShdw blurRad="41275" dist="12700" dir="12000000" algn="tl" rotWithShape="0">
-                    <a:srgbClr val="000000">
-                      <a:alpha val="40000"/>
-                    </a:srgbClr>
-                  </a:outerShdw>
-                </a:effectLst>
-              </a:rPr>
-              <a:t>Earth</a:t>
-            </a:r>
-            <a:endParaRPr lang="en-US" sz="5400" b="1" cap="none" spc="0" dirty="0">
-              <a:ln w="31550" cmpd="sng">
-                <a:gradFill>
-                  <a:gsLst>
-                    <a:gs pos="25000">
-                      <a:schemeClr val="accent1">
-                        <a:shade val="25000"/>
-                        <a:satMod val="190000"/>
-                      </a:schemeClr>
-                    </a:gs>
-                    <a:gs pos="80000">
-                      <a:schemeClr val="accent1">
-                        <a:tint val="75000"/>
-                        <a:satMod val="190000"/>
-                      </a:schemeClr>
-                    </a:gs>
-                  </a:gsLst>
-                  <a:lin ang="5400000"/>
-                </a:gradFill>
-                <a:prstDash val="solid"/>
-              </a:ln>
-              <a:solidFill>
-                <a:srgbClr val="FFFFFF"/>
-              </a:solidFill>
-              <a:effectLst>
-                <a:outerShdw blurRad="41275" dist="12700" dir="12000000" algn="tl" rotWithShape="0">
-                  <a:srgbClr val="000000">
-                    <a:alpha val="40000"/>
-                  </a:srgbClr>
-                </a:outerShdw>
-              </a:effectLst>
-            </a:endParaRPr>
-          </a:p>
-        </p:txBody>
-      </p:sp>
-      <p:sp>
-        <p:nvSpPr>
-          <p:cNvPr id="11" name="Rectangle 10"/>
-          <p:cNvSpPr/>
-          <p:nvPr/>
-        </p:nvSpPr>
-        <p:spPr>
-          <a:xfrm>
-            <a:off x="7940785" y="5934670"/>
-            <a:ext cx="1203215" cy="923330"/>
-          </a:xfrm>
-          <a:prstGeom prst="rect">
-            <a:avLst/>
-          </a:prstGeom>
-          <a:noFill/>
-        </p:spPr>
-        <p:txBody>
-          <a:bodyPr wrap="none" lIns="91440" tIns="45720" rIns="91440" bIns="45720">
-            <a:spAutoFit/>
-          </a:bodyPr>
-          <a:lstStyle/>
-          <a:p>
-            <a:pPr algn="ctr"/>
-            <a:r>
-              <a:rPr lang="en-US" sz="5400" b="1" cap="none" spc="0" dirty="0" smtClean="0">
-                <a:ln w="31550" cmpd="sng">
-                  <a:gradFill>
-                    <a:gsLst>
-                      <a:gs pos="25000">
-                        <a:schemeClr val="accent1">
-                          <a:shade val="25000"/>
-                          <a:satMod val="190000"/>
-                        </a:schemeClr>
-                      </a:gs>
-                      <a:gs pos="80000">
-                        <a:schemeClr val="accent1">
-                          <a:tint val="75000"/>
-                          <a:satMod val="190000"/>
-                        </a:schemeClr>
-                      </a:gs>
-                    </a:gsLst>
-                    <a:lin ang="5400000"/>
-                  </a:gradFill>
-                  <a:prstDash val="solid"/>
-                </a:ln>
-                <a:solidFill>
-                  <a:srgbClr val="FFFFFF"/>
-                </a:solidFill>
-                <a:effectLst>
-                  <a:outerShdw blurRad="41275" dist="12700" dir="12000000" algn="tl" rotWithShape="0">
-                    <a:srgbClr val="000000">
-                      <a:alpha val="40000"/>
-                    </a:srgbClr>
-                  </a:outerShdw>
-                </a:effectLst>
-              </a:rPr>
-              <a:t>Life</a:t>
-            </a:r>
-            <a:endParaRPr lang="en-US" sz="5400" b="1" cap="none" spc="0" dirty="0">
-              <a:ln w="31550" cmpd="sng">
-                <a:gradFill>
-                  <a:gsLst>
-                    <a:gs pos="25000">
-                      <a:schemeClr val="accent1">
-                        <a:shade val="25000"/>
-                        <a:satMod val="190000"/>
-                      </a:schemeClr>
-                    </a:gs>
-                    <a:gs pos="80000">
-                      <a:schemeClr val="accent1">
-                        <a:tint val="75000"/>
-                        <a:satMod val="190000"/>
-                      </a:schemeClr>
-                    </a:gs>
-                  </a:gsLst>
-                  <a:lin ang="5400000"/>
-                </a:gradFill>
-                <a:prstDash val="solid"/>
-              </a:ln>
-              <a:solidFill>
-                <a:srgbClr val="FFFFFF"/>
-              </a:solidFill>
-              <a:effectLst>
-                <a:outerShdw blurRad="41275" dist="12700" dir="12000000" algn="tl" rotWithShape="0">
-                  <a:srgbClr val="000000">
-                    <a:alpha val="40000"/>
-                  </a:srgbClr>
-                </a:outerShdw>
-              </a:effectLst>
-            </a:endParaRPr>
-          </a:p>
-        </p:txBody>
-      </p:sp>
-      <p:sp>
-        <p:nvSpPr>
-          <p:cNvPr id="13" name="Rectangle 12"/>
-          <p:cNvSpPr/>
-          <p:nvPr/>
-        </p:nvSpPr>
-        <p:spPr>
-          <a:xfrm>
-            <a:off x="2743200" y="5934670"/>
-            <a:ext cx="4310155" cy="923330"/>
-          </a:xfrm>
-          <a:prstGeom prst="rect">
-            <a:avLst/>
-          </a:prstGeom>
-          <a:noFill/>
-        </p:spPr>
-        <p:txBody>
-          <a:bodyPr wrap="none" lIns="91440" tIns="45720" rIns="91440" bIns="45720">
-            <a:spAutoFit/>
-          </a:bodyPr>
-          <a:lstStyle/>
-          <a:p>
-            <a:pPr algn="ctr"/>
-            <a:r>
-              <a:rPr lang="en-US" sz="5400" b="1" cap="none" spc="0" dirty="0" smtClean="0">
-                <a:ln w="31550" cmpd="sng">
-                  <a:gradFill>
-                    <a:gsLst>
-                      <a:gs pos="25000">
-                        <a:schemeClr val="accent1">
-                          <a:shade val="25000"/>
-                          <a:satMod val="190000"/>
-                        </a:schemeClr>
-                      </a:gs>
-                      <a:gs pos="80000">
-                        <a:schemeClr val="accent1">
-                          <a:tint val="75000"/>
-                          <a:satMod val="190000"/>
-                        </a:schemeClr>
-                      </a:gs>
-                    </a:gsLst>
-                    <a:lin ang="5400000"/>
-                  </a:gradFill>
-                  <a:prstDash val="solid"/>
-                </a:ln>
-                <a:solidFill>
-                  <a:srgbClr val="FFFFFF"/>
-                </a:solidFill>
-                <a:effectLst>
-                  <a:outerShdw blurRad="41275" dist="12700" dir="12000000" algn="tl" rotWithShape="0">
-                    <a:srgbClr val="000000">
-                      <a:alpha val="40000"/>
-                    </a:srgbClr>
-                  </a:outerShdw>
-                </a:effectLst>
-              </a:rPr>
-              <a:t>Semantic Web</a:t>
-            </a:r>
-            <a:endParaRPr lang="en-US" sz="5400" b="1" cap="none" spc="0" dirty="0">
-              <a:ln w="31550" cmpd="sng">
-                <a:gradFill>
-                  <a:gsLst>
-                    <a:gs pos="25000">
-                      <a:schemeClr val="accent1">
-                        <a:shade val="25000"/>
-                        <a:satMod val="190000"/>
-                      </a:schemeClr>
-                    </a:gs>
-                    <a:gs pos="80000">
-                      <a:schemeClr val="accent1">
-                        <a:tint val="75000"/>
-                        <a:satMod val="190000"/>
-                      </a:schemeClr>
-                    </a:gs>
-                  </a:gsLst>
-                  <a:lin ang="5400000"/>
-                </a:gradFill>
-                <a:prstDash val="solid"/>
-              </a:ln>
-              <a:solidFill>
-                <a:srgbClr val="FFFFFF"/>
-              </a:solidFill>
-              <a:effectLst>
-                <a:outerShdw blurRad="41275" dist="12700" dir="12000000" algn="tl" rotWithShape="0">
-                  <a:srgbClr val="000000">
-                    <a:alpha val="40000"/>
-                  </a:srgbClr>
-                </a:outerShdw>
-              </a:effectLst>
-            </a:endParaRPr>
-          </a:p>
-        </p:txBody>
-      </p:sp>
-      <p:sp>
-        <p:nvSpPr>
-          <p:cNvPr id="22" name="Left-Right Arrow 4"/>
-          <p:cNvSpPr/>
-          <p:nvPr/>
-        </p:nvSpPr>
-        <p:spPr>
-          <a:xfrm rot="3789444">
-            <a:off x="5806158" y="5097939"/>
-            <a:ext cx="738130" cy="186508"/>
-          </a:xfrm>
-          <a:prstGeom prst="rect">
-            <a:avLst/>
-          </a:prstGeom>
-        </p:spPr>
-        <p:style>
-          <a:lnRef idx="0">
-            <a:scrgbClr r="0" g="0" b="0"/>
-          </a:lnRef>
-          <a:fillRef idx="0">
-            <a:scrgbClr r="0" g="0" b="0"/>
-          </a:fillRef>
-          <a:effectRef idx="0">
-            <a:scrgbClr r="0" g="0" b="0"/>
-          </a:effectRef>
-          <a:fontRef idx="minor">
-            <a:schemeClr val="lt1"/>
-          </a:fontRef>
-        </p:style>
-        <p:txBody>
-          <a:bodyPr spcFirstLastPara="0" vert="horz" wrap="square" lIns="0" tIns="0" rIns="0" bIns="0" numCol="1" spcCol="1270" anchor="ctr" anchorCtr="0">
-            <a:noAutofit/>
-          </a:bodyPr>
-          <a:lstStyle/>
-          <a:p>
-            <a:pPr lvl="0" algn="ctr" defTabSz="488950">
-              <a:lnSpc>
-                <a:spcPct val="90000"/>
-              </a:lnSpc>
-              <a:spcBef>
-                <a:spcPct val="0"/>
-              </a:spcBef>
-              <a:spcAft>
-                <a:spcPct val="35000"/>
-              </a:spcAft>
-            </a:pPr>
-            <a:endParaRPr lang="en-US" sz="1100" kern="1200"/>
-          </a:p>
-        </p:txBody>
-      </p:sp>
-      <p:sp>
-        <p:nvSpPr>
-          <p:cNvPr id="33" name="Rectangle 32"/>
-          <p:cNvSpPr/>
-          <p:nvPr/>
-        </p:nvSpPr>
-        <p:spPr>
-          <a:xfrm>
-            <a:off x="3962400" y="3738274"/>
-            <a:ext cx="1143000" cy="457200"/>
-          </a:xfrm>
-          <a:prstGeom prst="rect">
-            <a:avLst/>
-          </a:prstGeom>
-          <a:solidFill>
-            <a:schemeClr val="accent6"/>
-          </a:solidFill>
-          <a:ln w="76200" cmpd="sng">
-            <a:solidFill>
-              <a:schemeClr val="accent4"/>
-            </a:solidFill>
-          </a:ln>
-        </p:spPr>
-        <p:style>
-          <a:lnRef idx="2">
-            <a:schemeClr val="accent1">
-              <a:shade val="50000"/>
-            </a:schemeClr>
-          </a:lnRef>
-          <a:fillRef idx="1">
-            <a:schemeClr val="accent1"/>
-          </a:fillRef>
-          <a:effectRef idx="0">
-            <a:schemeClr val="accent1"/>
-          </a:effectRef>
-          <a:fontRef idx="minor">
-            <a:schemeClr val="lt1"/>
-          </a:fontRef>
-        </p:style>
-        <p:txBody>
-          <a:bodyPr rtlCol="0" anchor="ctr"/>
-          <a:lstStyle/>
-          <a:p>
-            <a:pPr algn="ctr"/>
-            <a:r>
-              <a:rPr lang="en-US" sz="1200" dirty="0" smtClean="0"/>
-              <a:t>Published</a:t>
-            </a:r>
-          </a:p>
-          <a:p>
-            <a:pPr algn="ctr"/>
-            <a:r>
-              <a:rPr lang="en-US" sz="1200" dirty="0" smtClean="0"/>
-              <a:t>Web Services</a:t>
-            </a:r>
-            <a:endParaRPr lang="en-US" sz="1200" dirty="0"/>
-          </a:p>
-        </p:txBody>
-      </p:sp>
-      <p:sp>
-        <p:nvSpPr>
-          <p:cNvPr id="34" name="Rectangle 33"/>
-          <p:cNvSpPr/>
-          <p:nvPr/>
-        </p:nvSpPr>
-        <p:spPr>
-          <a:xfrm>
-            <a:off x="990600" y="3738274"/>
-            <a:ext cx="1143000" cy="457200"/>
-          </a:xfrm>
-          <a:prstGeom prst="rect">
-            <a:avLst/>
-          </a:prstGeom>
-          <a:solidFill>
-            <a:schemeClr val="accent6"/>
-          </a:solidFill>
-          <a:ln w="76200" cmpd="sng">
-            <a:solidFill>
-              <a:schemeClr val="accent4"/>
-            </a:solidFill>
-          </a:ln>
-        </p:spPr>
-        <p:style>
-          <a:lnRef idx="2">
-            <a:schemeClr val="accent1">
-              <a:shade val="50000"/>
-            </a:schemeClr>
-          </a:lnRef>
-          <a:fillRef idx="1">
-            <a:schemeClr val="accent1"/>
-          </a:fillRef>
-          <a:effectRef idx="0">
-            <a:schemeClr val="accent1"/>
-          </a:effectRef>
-          <a:fontRef idx="minor">
-            <a:schemeClr val="lt1"/>
-          </a:fontRef>
-        </p:style>
-        <p:txBody>
-          <a:bodyPr rtlCol="0" anchor="ctr"/>
-          <a:lstStyle/>
-          <a:p>
-            <a:pPr algn="ctr"/>
-            <a:r>
-              <a:rPr lang="en-US" sz="1200" dirty="0" smtClean="0"/>
-              <a:t>Published</a:t>
-            </a:r>
-          </a:p>
-          <a:p>
-            <a:pPr algn="ctr"/>
-            <a:r>
-              <a:rPr lang="en-US" sz="1200" dirty="0" smtClean="0"/>
-              <a:t>Web Services</a:t>
-            </a:r>
-            <a:endParaRPr lang="en-US" sz="1200" dirty="0"/>
-          </a:p>
-        </p:txBody>
-      </p:sp>
-      <p:sp>
-        <p:nvSpPr>
-          <p:cNvPr id="37" name="TextBox 36"/>
-          <p:cNvSpPr txBox="1"/>
-          <p:nvPr/>
-        </p:nvSpPr>
-        <p:spPr>
-          <a:xfrm>
-            <a:off x="4539547" y="228600"/>
-            <a:ext cx="4452053" cy="954107"/>
-          </a:xfrm>
-          <a:prstGeom prst="rect">
-            <a:avLst/>
-          </a:prstGeom>
-          <a:noFill/>
-        </p:spPr>
-        <p:txBody>
-          <a:bodyPr wrap="none" rtlCol="0">
-            <a:spAutoFit/>
-          </a:bodyPr>
-          <a:lstStyle/>
-          <a:p>
-            <a:r>
-              <a:rPr lang="en-US" sz="1400" dirty="0" smtClean="0"/>
-              <a:t>Questions of interest:</a:t>
-            </a:r>
-          </a:p>
-          <a:p>
-            <a:r>
-              <a:rPr lang="en-US" sz="1400" dirty="0" smtClean="0"/>
-              <a:t>How to automate manual process?  </a:t>
-            </a:r>
-            <a:r>
-              <a:rPr lang="en-US" sz="1400" dirty="0" smtClean="0">
-                <a:solidFill>
-                  <a:schemeClr val="bg2">
-                    <a:lumMod val="50000"/>
-                  </a:schemeClr>
-                </a:solidFill>
-              </a:rPr>
-              <a:t>Semantic technologies</a:t>
-            </a:r>
-          </a:p>
-          <a:p>
-            <a:r>
-              <a:rPr lang="en-US" sz="1400" dirty="0" smtClean="0">
-                <a:solidFill>
-                  <a:schemeClr val="bg1">
-                    <a:lumMod val="65000"/>
-                  </a:schemeClr>
-                </a:solidFill>
-              </a:rPr>
-              <a:t>How to keep track of data sources and analysis paths?</a:t>
-            </a:r>
-          </a:p>
-          <a:p>
-            <a:r>
-              <a:rPr lang="en-US" sz="1400" dirty="0" smtClean="0">
-                <a:solidFill>
-                  <a:schemeClr val="bg1">
-                    <a:lumMod val="65000"/>
-                  </a:schemeClr>
-                </a:solidFill>
-              </a:rPr>
-              <a:t>How to understand voluminous datasets generated?</a:t>
-            </a:r>
-            <a:endParaRPr lang="en-US" sz="1400" dirty="0">
-              <a:solidFill>
-                <a:schemeClr val="bg1">
-                  <a:lumMod val="65000"/>
-                </a:schemeClr>
-              </a:solidFill>
-            </a:endParaRPr>
-          </a:p>
-        </p:txBody>
-      </p:sp>
-      <p:sp>
-        <p:nvSpPr>
-          <p:cNvPr id="40" name="Rectangle 39"/>
-          <p:cNvSpPr/>
-          <p:nvPr/>
-        </p:nvSpPr>
-        <p:spPr>
-          <a:xfrm>
-            <a:off x="2514600" y="2286000"/>
-            <a:ext cx="1143000" cy="457200"/>
-          </a:xfrm>
-          <a:prstGeom prst="rect">
-            <a:avLst/>
-          </a:prstGeom>
-          <a:solidFill>
-            <a:schemeClr val="accent6"/>
-          </a:solidFill>
-          <a:ln w="76200" cmpd="sng">
-            <a:solidFill>
-              <a:schemeClr val="accent4"/>
-            </a:solidFill>
-          </a:ln>
-        </p:spPr>
-        <p:style>
-          <a:lnRef idx="2">
-            <a:schemeClr val="accent1">
-              <a:shade val="50000"/>
-            </a:schemeClr>
-          </a:lnRef>
-          <a:fillRef idx="1">
-            <a:schemeClr val="accent1"/>
-          </a:fillRef>
-          <a:effectRef idx="0">
-            <a:schemeClr val="accent1"/>
-          </a:effectRef>
-          <a:fontRef idx="minor">
-            <a:schemeClr val="lt1"/>
-          </a:fontRef>
-        </p:style>
-        <p:txBody>
-          <a:bodyPr rtlCol="0" anchor="ctr"/>
-          <a:lstStyle/>
-          <a:p>
-            <a:pPr algn="ctr"/>
-            <a:r>
-              <a:rPr lang="en-US" sz="1200" dirty="0" smtClean="0"/>
-              <a:t>Published 1</a:t>
-            </a:r>
-          </a:p>
-          <a:p>
-            <a:pPr algn="ctr"/>
-            <a:r>
-              <a:rPr lang="en-US" sz="1200" dirty="0" smtClean="0"/>
-              <a:t>Web Service</a:t>
-            </a:r>
-            <a:endParaRPr lang="en-US" sz="1200" dirty="0"/>
-          </a:p>
-        </p:txBody>
-      </p:sp>
-      <p:sp>
-        <p:nvSpPr>
-          <p:cNvPr id="41" name="TextBox 40"/>
-          <p:cNvSpPr txBox="1"/>
-          <p:nvPr/>
-        </p:nvSpPr>
-        <p:spPr>
-          <a:xfrm>
-            <a:off x="1447800" y="2819400"/>
-            <a:ext cx="3352800" cy="369332"/>
-          </a:xfrm>
-          <a:prstGeom prst="rect">
-            <a:avLst/>
-          </a:prstGeom>
-          <a:noFill/>
-        </p:spPr>
-        <p:txBody>
-          <a:bodyPr wrap="square" rtlCol="0">
-            <a:spAutoFit/>
-          </a:bodyPr>
-          <a:lstStyle/>
-          <a:p>
-            <a:pPr algn="ctr"/>
-            <a:r>
-              <a:rPr lang="en-US" b="1" dirty="0" smtClean="0"/>
-              <a:t>Semantic Service</a:t>
-            </a:r>
-            <a:r>
-              <a:rPr lang="en-US" b="1" dirty="0"/>
-              <a:t> </a:t>
-            </a:r>
-            <a:r>
-              <a:rPr lang="en-US" b="1" dirty="0" smtClean="0"/>
-              <a:t>Orchestration</a:t>
-            </a:r>
-            <a:endParaRPr lang="en-US" b="1" dirty="0"/>
-          </a:p>
-        </p:txBody>
-      </p:sp>
-      <p:grpSp>
-        <p:nvGrpSpPr>
-          <p:cNvPr id="16" name="Group 15"/>
-          <p:cNvGrpSpPr/>
-          <p:nvPr/>
-        </p:nvGrpSpPr>
-        <p:grpSpPr>
-          <a:xfrm>
-            <a:off x="5791200" y="2747674"/>
-            <a:ext cx="1776263" cy="1981200"/>
-            <a:chOff x="1904993" y="-3"/>
-            <a:chExt cx="1776263" cy="757762"/>
-          </a:xfrm>
-        </p:grpSpPr>
-        <p:sp>
-          <p:nvSpPr>
-            <p:cNvPr id="17" name="Rounded Rectangle 16"/>
-            <p:cNvSpPr/>
-            <p:nvPr/>
-          </p:nvSpPr>
-          <p:spPr>
-            <a:xfrm>
-              <a:off x="1904993" y="-3"/>
-              <a:ext cx="1776263" cy="757762"/>
-            </a:xfrm>
-            <a:prstGeom prst="roundRect">
-              <a:avLst>
-                <a:gd name="adj" fmla="val 10000"/>
-              </a:avLst>
-            </a:prstGeom>
-            <a:solidFill>
-              <a:schemeClr val="accent4"/>
-            </a:solidFill>
-          </p:spPr>
-          <p:style>
-            <a:lnRef idx="2">
-              <a:schemeClr val="lt1">
-                <a:hueOff val="0"/>
-                <a:satOff val="0"/>
-                <a:lumOff val="0"/>
-                <a:alphaOff val="0"/>
-              </a:schemeClr>
-            </a:lnRef>
-            <a:fillRef idx="1">
-              <a:scrgbClr r="0" g="0" b="0"/>
-            </a:fillRef>
-            <a:effectRef idx="0">
-              <a:schemeClr val="accent1">
-                <a:hueOff val="0"/>
-                <a:satOff val="0"/>
-                <a:lumOff val="0"/>
-                <a:alphaOff val="0"/>
-              </a:schemeClr>
-            </a:effectRef>
-            <a:fontRef idx="minor">
-              <a:schemeClr val="lt1"/>
-            </a:fontRef>
-          </p:style>
-        </p:sp>
-        <p:sp>
-          <p:nvSpPr>
-            <p:cNvPr id="18" name="Rounded Rectangle 4"/>
-            <p:cNvSpPr/>
-            <p:nvPr/>
-          </p:nvSpPr>
-          <p:spPr>
-            <a:xfrm>
-              <a:off x="1927187" y="22191"/>
-              <a:ext cx="1731875" cy="713374"/>
-            </a:xfrm>
-            <a:prstGeom prst="rect">
-              <a:avLst/>
-            </a:prstGeom>
-          </p:spPr>
-          <p:style>
-            <a:lnRef idx="0">
-              <a:scrgbClr r="0" g="0" b="0"/>
-            </a:lnRef>
-            <a:fillRef idx="0">
-              <a:scrgbClr r="0" g="0" b="0"/>
-            </a:fillRef>
-            <a:effectRef idx="0">
-              <a:scrgbClr r="0" g="0" b="0"/>
-            </a:effectRef>
-            <a:fontRef idx="minor">
-              <a:schemeClr val="lt1"/>
-            </a:fontRef>
-          </p:style>
-          <p:txBody>
-            <a:bodyPr spcFirstLastPara="0" vert="horz" wrap="square" lIns="53340" tIns="53340" rIns="53340" bIns="53340" numCol="1" spcCol="1270" anchor="ctr" anchorCtr="0">
-              <a:noAutofit/>
-            </a:bodyPr>
-            <a:lstStyle/>
-            <a:p>
-              <a:pPr lvl="0" algn="ctr" defTabSz="622300">
-                <a:lnSpc>
-                  <a:spcPct val="90000"/>
-                </a:lnSpc>
-                <a:spcBef>
-                  <a:spcPct val="0"/>
-                </a:spcBef>
-                <a:spcAft>
-                  <a:spcPct val="35000"/>
-                </a:spcAft>
-              </a:pPr>
-              <a:r>
-                <a:rPr lang="en-US" sz="1400" b="1" kern="1200" dirty="0" smtClean="0"/>
-                <a:t>Semantic Automated Discovery &amp; Integration</a:t>
-              </a:r>
-            </a:p>
-            <a:p>
-              <a:pPr lvl="0" algn="ctr" defTabSz="622300">
-                <a:lnSpc>
-                  <a:spcPct val="90000"/>
-                </a:lnSpc>
-                <a:spcBef>
-                  <a:spcPct val="0"/>
-                </a:spcBef>
-                <a:spcAft>
-                  <a:spcPct val="35000"/>
-                </a:spcAft>
-              </a:pPr>
-              <a:r>
-                <a:rPr lang="en-US" sz="1400" b="1" dirty="0" smtClean="0"/>
-                <a:t>(SADI) Services</a:t>
-              </a:r>
-            </a:p>
-            <a:p>
-              <a:pPr lvl="0" algn="ctr" defTabSz="622300">
-                <a:lnSpc>
-                  <a:spcPct val="90000"/>
-                </a:lnSpc>
-                <a:spcBef>
-                  <a:spcPct val="0"/>
-                </a:spcBef>
-                <a:spcAft>
-                  <a:spcPct val="35000"/>
-                </a:spcAft>
-              </a:pPr>
-              <a:r>
-                <a:rPr lang="en-US" sz="1400" b="1" kern="1200" dirty="0" smtClean="0"/>
-                <a:t>Semantic annotation of Service inputs and outputs </a:t>
-              </a:r>
-            </a:p>
-            <a:p>
-              <a:pPr lvl="0" algn="ctr" defTabSz="622300">
-                <a:lnSpc>
-                  <a:spcPct val="90000"/>
-                </a:lnSpc>
-                <a:spcBef>
-                  <a:spcPct val="0"/>
-                </a:spcBef>
-                <a:spcAft>
-                  <a:spcPct val="35000"/>
-                </a:spcAft>
-              </a:pPr>
-              <a:r>
-                <a:rPr lang="en-US" sz="1400" b="1" kern="1200" dirty="0" smtClean="0"/>
-                <a:t>Service “wrappers”</a:t>
-              </a:r>
-            </a:p>
-          </p:txBody>
-        </p:sp>
-      </p:grpSp>
-      <p:grpSp>
-        <p:nvGrpSpPr>
-          <p:cNvPr id="23" name="Group 22"/>
-          <p:cNvGrpSpPr/>
-          <p:nvPr/>
-        </p:nvGrpSpPr>
-        <p:grpSpPr>
-          <a:xfrm>
-            <a:off x="685800" y="4271674"/>
-            <a:ext cx="1776263" cy="838200"/>
-            <a:chOff x="312837" y="2362199"/>
-            <a:chExt cx="1776263" cy="1104498"/>
-          </a:xfrm>
-        </p:grpSpPr>
-        <p:sp>
-          <p:nvSpPr>
-            <p:cNvPr id="24" name="Rounded Rectangle 23"/>
-            <p:cNvSpPr/>
-            <p:nvPr/>
-          </p:nvSpPr>
-          <p:spPr>
-            <a:xfrm>
-              <a:off x="312837" y="2362199"/>
-              <a:ext cx="1776263" cy="1104498"/>
-            </a:xfrm>
-            <a:prstGeom prst="roundRect">
-              <a:avLst>
-                <a:gd name="adj" fmla="val 10000"/>
-              </a:avLst>
-            </a:prstGeom>
-          </p:spPr>
-          <p:style>
-            <a:lnRef idx="2">
-              <a:schemeClr val="lt1">
-                <a:hueOff val="0"/>
-                <a:satOff val="0"/>
-                <a:lumOff val="0"/>
-                <a:alphaOff val="0"/>
-              </a:schemeClr>
-            </a:lnRef>
-            <a:fillRef idx="1">
-              <a:schemeClr val="accent1">
-                <a:hueOff val="0"/>
-                <a:satOff val="0"/>
-                <a:lumOff val="0"/>
-                <a:alphaOff val="0"/>
-              </a:schemeClr>
-            </a:fillRef>
-            <a:effectRef idx="0">
-              <a:schemeClr val="accent1">
-                <a:hueOff val="0"/>
-                <a:satOff val="0"/>
-                <a:lumOff val="0"/>
-                <a:alphaOff val="0"/>
-              </a:schemeClr>
-            </a:effectRef>
-            <a:fontRef idx="minor">
-              <a:schemeClr val="lt1"/>
-            </a:fontRef>
-          </p:style>
-        </p:sp>
-        <p:sp>
-          <p:nvSpPr>
-            <p:cNvPr id="27" name="Rounded Rectangle 4"/>
-            <p:cNvSpPr/>
-            <p:nvPr/>
-          </p:nvSpPr>
-          <p:spPr>
-            <a:xfrm>
-              <a:off x="345187" y="2394549"/>
-              <a:ext cx="1711563" cy="1039798"/>
-            </a:xfrm>
-            <a:prstGeom prst="rect">
-              <a:avLst/>
-            </a:prstGeom>
-          </p:spPr>
-          <p:style>
-            <a:lnRef idx="0">
-              <a:scrgbClr r="0" g="0" b="0"/>
-            </a:lnRef>
-            <a:fillRef idx="0">
-              <a:scrgbClr r="0" g="0" b="0"/>
-            </a:fillRef>
-            <a:effectRef idx="0">
-              <a:scrgbClr r="0" g="0" b="0"/>
-            </a:effectRef>
-            <a:fontRef idx="minor">
-              <a:schemeClr val="lt1"/>
-            </a:fontRef>
-          </p:style>
-          <p:txBody>
-            <a:bodyPr spcFirstLastPara="0" vert="horz" wrap="square" lIns="53340" tIns="53340" rIns="53340" bIns="53340" numCol="1" spcCol="1270" anchor="ctr" anchorCtr="0">
-              <a:noAutofit/>
-            </a:bodyPr>
-            <a:lstStyle/>
-            <a:p>
-              <a:pPr lvl="0" algn="ctr" defTabSz="622300">
-                <a:lnSpc>
-                  <a:spcPct val="90000"/>
-                </a:lnSpc>
-                <a:spcBef>
-                  <a:spcPct val="0"/>
-                </a:spcBef>
-                <a:spcAft>
-                  <a:spcPct val="35000"/>
-                </a:spcAft>
-              </a:pPr>
-              <a:r>
-                <a:rPr lang="en-US" sz="1400" b="1" kern="1200" dirty="0" smtClean="0"/>
-                <a:t>Earth Data Analysis Center (EDAC)</a:t>
-              </a:r>
-            </a:p>
-          </p:txBody>
-        </p:sp>
-      </p:grpSp>
-      <p:grpSp>
-        <p:nvGrpSpPr>
-          <p:cNvPr id="31" name="Group 30"/>
-          <p:cNvGrpSpPr/>
-          <p:nvPr/>
-        </p:nvGrpSpPr>
-        <p:grpSpPr>
-          <a:xfrm>
-            <a:off x="3657600" y="4271674"/>
-            <a:ext cx="1776263" cy="885494"/>
-            <a:chOff x="3244899" y="2331039"/>
-            <a:chExt cx="1776263" cy="1166818"/>
-          </a:xfrm>
-        </p:grpSpPr>
-        <p:sp>
-          <p:nvSpPr>
-            <p:cNvPr id="32" name="Rounded Rectangle 31"/>
-            <p:cNvSpPr/>
-            <p:nvPr/>
-          </p:nvSpPr>
-          <p:spPr>
-            <a:xfrm>
-              <a:off x="3244899" y="2331039"/>
-              <a:ext cx="1776263" cy="1166818"/>
-            </a:xfrm>
-            <a:prstGeom prst="roundRect">
-              <a:avLst>
-                <a:gd name="adj" fmla="val 10000"/>
-              </a:avLst>
-            </a:prstGeom>
-          </p:spPr>
-          <p:style>
-            <a:lnRef idx="2">
-              <a:schemeClr val="lt1">
-                <a:hueOff val="0"/>
-                <a:satOff val="0"/>
-                <a:lumOff val="0"/>
-                <a:alphaOff val="0"/>
-              </a:schemeClr>
-            </a:lnRef>
-            <a:fillRef idx="1">
-              <a:schemeClr val="accent1">
-                <a:hueOff val="0"/>
-                <a:satOff val="0"/>
-                <a:lumOff val="0"/>
-                <a:alphaOff val="0"/>
-              </a:schemeClr>
-            </a:fillRef>
-            <a:effectRef idx="0">
-              <a:schemeClr val="accent1">
-                <a:hueOff val="0"/>
-                <a:satOff val="0"/>
-                <a:lumOff val="0"/>
-                <a:alphaOff val="0"/>
-              </a:schemeClr>
-            </a:effectRef>
-            <a:fontRef idx="minor">
-              <a:schemeClr val="lt1"/>
-            </a:fontRef>
-          </p:style>
-        </p:sp>
-        <p:sp>
-          <p:nvSpPr>
-            <p:cNvPr id="35" name="Rounded Rectangle 4"/>
-            <p:cNvSpPr/>
-            <p:nvPr/>
-          </p:nvSpPr>
-          <p:spPr>
-            <a:xfrm>
-              <a:off x="3279074" y="2365214"/>
-              <a:ext cx="1707913" cy="1098468"/>
-            </a:xfrm>
-            <a:prstGeom prst="rect">
-              <a:avLst/>
-            </a:prstGeom>
-          </p:spPr>
-          <p:style>
-            <a:lnRef idx="0">
-              <a:scrgbClr r="0" g="0" b="0"/>
-            </a:lnRef>
-            <a:fillRef idx="0">
-              <a:scrgbClr r="0" g="0" b="0"/>
-            </a:fillRef>
-            <a:effectRef idx="0">
-              <a:scrgbClr r="0" g="0" b="0"/>
-            </a:effectRef>
-            <a:fontRef idx="minor">
-              <a:schemeClr val="lt1"/>
-            </a:fontRef>
-          </p:style>
-          <p:txBody>
-            <a:bodyPr spcFirstLastPara="0" vert="horz" wrap="square" lIns="53340" tIns="53340" rIns="53340" bIns="53340" numCol="1" spcCol="1270" anchor="ctr" anchorCtr="0">
-              <a:noAutofit/>
-            </a:bodyPr>
-            <a:lstStyle/>
-            <a:p>
-              <a:pPr lvl="0" algn="ctr" defTabSz="622300">
-                <a:lnSpc>
-                  <a:spcPct val="90000"/>
-                </a:lnSpc>
-                <a:spcBef>
-                  <a:spcPct val="0"/>
-                </a:spcBef>
-                <a:spcAft>
-                  <a:spcPct val="35000"/>
-                </a:spcAft>
-              </a:pPr>
-              <a:r>
-                <a:rPr lang="en-US" sz="1400" b="1" kern="1200" dirty="0" err="1" smtClean="0"/>
-                <a:t>Lifemapper</a:t>
-              </a:r>
-              <a:endParaRPr lang="en-US" sz="1400" b="1" kern="1200" dirty="0" smtClean="0"/>
-            </a:p>
-            <a:p>
-              <a:pPr lvl="0" algn="ctr" defTabSz="622300">
-                <a:lnSpc>
-                  <a:spcPct val="90000"/>
-                </a:lnSpc>
-                <a:spcBef>
-                  <a:spcPct val="0"/>
-                </a:spcBef>
-                <a:spcAft>
-                  <a:spcPct val="35000"/>
-                </a:spcAft>
-              </a:pPr>
-              <a:r>
-                <a:rPr lang="en-US" sz="1400" b="1" kern="1200" dirty="0" smtClean="0"/>
-                <a:t>Species Distribution Models</a:t>
-              </a:r>
-            </a:p>
-          </p:txBody>
-        </p:sp>
-      </p:grpSp>
-      <p:cxnSp>
-        <p:nvCxnSpPr>
-          <p:cNvPr id="3" name="Straight Arrow Connector 2"/>
-          <p:cNvCxnSpPr>
-            <a:stCxn id="17" idx="1"/>
-            <a:endCxn id="33" idx="3"/>
-          </p:cNvCxnSpPr>
-          <p:nvPr/>
-        </p:nvCxnSpPr>
-        <p:spPr>
-          <a:xfrm flipH="1">
-            <a:off x="5105400" y="3738274"/>
-            <a:ext cx="685800" cy="228600"/>
-          </a:xfrm>
-          <a:prstGeom prst="straightConnector1">
-            <a:avLst/>
-          </a:prstGeom>
-          <a:ln>
-            <a:solidFill>
-              <a:schemeClr val="accent4"/>
-            </a:solidFill>
-            <a:tailEnd type="arrow"/>
-          </a:ln>
-        </p:spPr>
-        <p:style>
-          <a:lnRef idx="2">
-            <a:schemeClr val="accent1"/>
-          </a:lnRef>
-          <a:fillRef idx="0">
-            <a:schemeClr val="accent1"/>
-          </a:fillRef>
-          <a:effectRef idx="1">
-            <a:schemeClr val="accent1"/>
-          </a:effectRef>
-          <a:fontRef idx="minor">
-            <a:schemeClr val="tx1"/>
-          </a:fontRef>
-        </p:style>
-      </p:cxnSp>
-      <p:grpSp>
-        <p:nvGrpSpPr>
-          <p:cNvPr id="36" name="Group 35"/>
-          <p:cNvGrpSpPr/>
-          <p:nvPr/>
-        </p:nvGrpSpPr>
-        <p:grpSpPr>
-          <a:xfrm>
-            <a:off x="1143000" y="1295400"/>
-            <a:ext cx="1547663" cy="838200"/>
-            <a:chOff x="1904988" y="0"/>
-            <a:chExt cx="1776263" cy="452956"/>
-          </a:xfrm>
-        </p:grpSpPr>
-        <p:sp>
-          <p:nvSpPr>
-            <p:cNvPr id="42" name="Rounded Rectangle 41"/>
-            <p:cNvSpPr/>
-            <p:nvPr/>
-          </p:nvSpPr>
-          <p:spPr>
-            <a:xfrm>
-              <a:off x="1904988" y="0"/>
-              <a:ext cx="1776263" cy="452956"/>
-            </a:xfrm>
-            <a:prstGeom prst="roundRect">
-              <a:avLst>
-                <a:gd name="adj" fmla="val 10000"/>
-              </a:avLst>
-            </a:prstGeom>
-            <a:solidFill>
-              <a:schemeClr val="accent4"/>
-            </a:solidFill>
-          </p:spPr>
-          <p:style>
-            <a:lnRef idx="2">
-              <a:schemeClr val="lt1">
-                <a:hueOff val="0"/>
-                <a:satOff val="0"/>
-                <a:lumOff val="0"/>
-                <a:alphaOff val="0"/>
-              </a:schemeClr>
-            </a:lnRef>
-            <a:fillRef idx="1">
-              <a:scrgbClr r="0" g="0" b="0"/>
-            </a:fillRef>
-            <a:effectRef idx="0">
-              <a:schemeClr val="accent1">
-                <a:hueOff val="0"/>
-                <a:satOff val="0"/>
-                <a:lumOff val="0"/>
-                <a:alphaOff val="0"/>
-              </a:schemeClr>
-            </a:effectRef>
-            <a:fontRef idx="minor">
-              <a:schemeClr val="lt1"/>
-            </a:fontRef>
-          </p:style>
-        </p:sp>
-        <p:sp>
-          <p:nvSpPr>
-            <p:cNvPr id="43" name="Rounded Rectangle 4"/>
-            <p:cNvSpPr/>
-            <p:nvPr/>
-          </p:nvSpPr>
-          <p:spPr>
-            <a:xfrm>
-              <a:off x="1918255" y="13267"/>
-              <a:ext cx="1749729" cy="426422"/>
-            </a:xfrm>
-            <a:prstGeom prst="rect">
-              <a:avLst/>
-            </a:prstGeom>
-          </p:spPr>
-          <p:style>
-            <a:lnRef idx="0">
-              <a:scrgbClr r="0" g="0" b="0"/>
-            </a:lnRef>
-            <a:fillRef idx="0">
-              <a:scrgbClr r="0" g="0" b="0"/>
-            </a:fillRef>
-            <a:effectRef idx="0">
-              <a:scrgbClr r="0" g="0" b="0"/>
-            </a:effectRef>
-            <a:fontRef idx="minor">
-              <a:schemeClr val="lt1"/>
-            </a:fontRef>
-          </p:style>
-          <p:txBody>
-            <a:bodyPr spcFirstLastPara="0" vert="horz" wrap="square" lIns="53340" tIns="53340" rIns="53340" bIns="53340" numCol="1" spcCol="1270" anchor="ctr" anchorCtr="0">
-              <a:noAutofit/>
-            </a:bodyPr>
-            <a:lstStyle/>
-            <a:p>
-              <a:pPr lvl="0" algn="ctr" defTabSz="622300">
-                <a:lnSpc>
-                  <a:spcPct val="90000"/>
-                </a:lnSpc>
-                <a:spcBef>
-                  <a:spcPct val="0"/>
-                </a:spcBef>
-                <a:spcAft>
-                  <a:spcPct val="35000"/>
-                </a:spcAft>
-              </a:pPr>
-              <a:r>
-                <a:rPr lang="en-US" b="1" dirty="0" smtClean="0"/>
-                <a:t>Reuse</a:t>
-              </a:r>
-            </a:p>
-            <a:p>
-              <a:pPr lvl="0" algn="ctr" defTabSz="622300">
-                <a:lnSpc>
-                  <a:spcPct val="90000"/>
-                </a:lnSpc>
-                <a:spcBef>
-                  <a:spcPct val="0"/>
-                </a:spcBef>
-                <a:spcAft>
-                  <a:spcPct val="35000"/>
-                </a:spcAft>
-              </a:pPr>
-              <a:r>
-                <a:rPr lang="en-US" b="1" kern="1200" dirty="0" err="1" smtClean="0"/>
-                <a:t>CardioShARE</a:t>
-              </a:r>
-              <a:endParaRPr lang="en-US" b="1" kern="1200" dirty="0" smtClean="0"/>
-            </a:p>
-          </p:txBody>
-        </p:sp>
-      </p:grpSp>
-      <p:grpSp>
-        <p:nvGrpSpPr>
-          <p:cNvPr id="44" name="Group 43"/>
-          <p:cNvGrpSpPr/>
-          <p:nvPr/>
-        </p:nvGrpSpPr>
-        <p:grpSpPr>
-          <a:xfrm>
-            <a:off x="3429000" y="1295400"/>
-            <a:ext cx="1524000" cy="838200"/>
-            <a:chOff x="1904988" y="0"/>
-            <a:chExt cx="1776263" cy="452956"/>
-          </a:xfrm>
-        </p:grpSpPr>
-        <p:sp>
-          <p:nvSpPr>
-            <p:cNvPr id="45" name="Rounded Rectangle 44"/>
-            <p:cNvSpPr/>
-            <p:nvPr/>
-          </p:nvSpPr>
-          <p:spPr>
-            <a:xfrm>
-              <a:off x="1904988" y="0"/>
-              <a:ext cx="1776263" cy="452956"/>
-            </a:xfrm>
-            <a:prstGeom prst="roundRect">
-              <a:avLst>
-                <a:gd name="adj" fmla="val 10000"/>
-              </a:avLst>
-            </a:prstGeom>
-            <a:solidFill>
-              <a:schemeClr val="accent4"/>
-            </a:solidFill>
-          </p:spPr>
-          <p:style>
-            <a:lnRef idx="2">
-              <a:schemeClr val="lt1">
-                <a:hueOff val="0"/>
-                <a:satOff val="0"/>
-                <a:lumOff val="0"/>
-                <a:alphaOff val="0"/>
-              </a:schemeClr>
-            </a:lnRef>
-            <a:fillRef idx="1">
-              <a:scrgbClr r="0" g="0" b="0"/>
-            </a:fillRef>
-            <a:effectRef idx="0">
-              <a:schemeClr val="accent1">
-                <a:hueOff val="0"/>
-                <a:satOff val="0"/>
-                <a:lumOff val="0"/>
-                <a:alphaOff val="0"/>
-              </a:schemeClr>
-            </a:effectRef>
-            <a:fontRef idx="minor">
-              <a:schemeClr val="lt1"/>
-            </a:fontRef>
-          </p:style>
-        </p:sp>
-        <p:sp>
-          <p:nvSpPr>
-            <p:cNvPr id="46" name="Rounded Rectangle 4"/>
-            <p:cNvSpPr/>
-            <p:nvPr/>
-          </p:nvSpPr>
-          <p:spPr>
-            <a:xfrm>
-              <a:off x="1918255" y="13267"/>
-              <a:ext cx="1749729" cy="426422"/>
-            </a:xfrm>
-            <a:prstGeom prst="rect">
-              <a:avLst/>
-            </a:prstGeom>
-          </p:spPr>
-          <p:style>
-            <a:lnRef idx="0">
-              <a:scrgbClr r="0" g="0" b="0"/>
-            </a:lnRef>
-            <a:fillRef idx="0">
-              <a:scrgbClr r="0" g="0" b="0"/>
-            </a:fillRef>
-            <a:effectRef idx="0">
-              <a:scrgbClr r="0" g="0" b="0"/>
-            </a:effectRef>
-            <a:fontRef idx="minor">
-              <a:schemeClr val="lt1"/>
-            </a:fontRef>
-          </p:style>
-          <p:txBody>
-            <a:bodyPr spcFirstLastPara="0" vert="horz" wrap="square" lIns="53340" tIns="53340" rIns="53340" bIns="53340" numCol="1" spcCol="1270" anchor="ctr" anchorCtr="0">
-              <a:noAutofit/>
-            </a:bodyPr>
-            <a:lstStyle/>
-            <a:p>
-              <a:pPr lvl="0" algn="ctr" defTabSz="622300">
-                <a:lnSpc>
-                  <a:spcPct val="90000"/>
-                </a:lnSpc>
-                <a:spcBef>
-                  <a:spcPct val="0"/>
-                </a:spcBef>
-                <a:spcAft>
-                  <a:spcPct val="35000"/>
-                </a:spcAft>
-              </a:pPr>
-              <a:r>
-                <a:rPr lang="en-US" b="1" dirty="0" smtClean="0"/>
-                <a:t>Knowledge </a:t>
-              </a:r>
-              <a:r>
-                <a:rPr lang="en-US" b="1" dirty="0"/>
-                <a:t>B</a:t>
-              </a:r>
-              <a:r>
-                <a:rPr lang="en-US" b="1" dirty="0" smtClean="0"/>
-                <a:t>ase</a:t>
-              </a:r>
-              <a:endParaRPr lang="en-US" b="1" kern="1200" dirty="0" smtClean="0"/>
-            </a:p>
-          </p:txBody>
-        </p:sp>
-      </p:grpSp>
-      <p:sp>
-        <p:nvSpPr>
-          <p:cNvPr id="5" name="Left-Right Arrow 4"/>
-          <p:cNvSpPr/>
-          <p:nvPr/>
-        </p:nvSpPr>
-        <p:spPr>
-          <a:xfrm>
-            <a:off x="2743200" y="1676400"/>
-            <a:ext cx="609600" cy="228600"/>
-          </a:xfrm>
-          <a:prstGeom prst="leftRightArrow">
-            <a:avLst/>
-          </a:prstGeom>
-          <a:solidFill>
-            <a:schemeClr val="accent5"/>
-          </a:solidFill>
-          <a:ln>
-            <a:solidFill>
-              <a:srgbClr val="39639D"/>
-            </a:solidFill>
-          </a:ln>
-        </p:spPr>
-        <p:style>
-          <a:lnRef idx="1">
-            <a:schemeClr val="accent1"/>
-          </a:lnRef>
-          <a:fillRef idx="3">
-            <a:schemeClr val="accent1"/>
-          </a:fillRef>
-          <a:effectRef idx="2">
-            <a:schemeClr val="accent1"/>
-          </a:effectRef>
-          <a:fontRef idx="minor">
-            <a:schemeClr val="lt1"/>
-          </a:fontRef>
-        </p:style>
-        <p:txBody>
-          <a:bodyPr rtlCol="0" anchor="ctr"/>
-          <a:lstStyle/>
-          <a:p>
-            <a:pPr algn="ctr"/>
-            <a:endParaRPr lang="en-US"/>
-          </a:p>
-        </p:txBody>
-      </p:sp>
-      <p:sp>
-        <p:nvSpPr>
-          <p:cNvPr id="47" name="Left-Right Arrow 46"/>
-          <p:cNvSpPr/>
-          <p:nvPr/>
-        </p:nvSpPr>
-        <p:spPr>
-          <a:xfrm>
-            <a:off x="1143000" y="3276600"/>
-            <a:ext cx="3962400" cy="304800"/>
-          </a:xfrm>
-          <a:prstGeom prst="leftRightArrow">
-            <a:avLst/>
-          </a:prstGeom>
-          <a:solidFill>
-            <a:schemeClr val="accent5"/>
-          </a:solidFill>
-          <a:ln>
-            <a:solidFill>
-              <a:srgbClr val="39639D"/>
-            </a:solidFill>
-          </a:ln>
-        </p:spPr>
-        <p:style>
-          <a:lnRef idx="1">
-            <a:schemeClr val="accent1"/>
-          </a:lnRef>
-          <a:fillRef idx="3">
-            <a:schemeClr val="accent1"/>
-          </a:fillRef>
-          <a:effectRef idx="2">
-            <a:schemeClr val="accent1"/>
-          </a:effectRef>
-          <a:fontRef idx="minor">
-            <a:schemeClr val="lt1"/>
-          </a:fontRef>
-        </p:style>
-        <p:txBody>
-          <a:bodyPr rtlCol="0" anchor="ctr"/>
-          <a:lstStyle/>
-          <a:p>
-            <a:pPr algn="ctr"/>
-            <a:endParaRPr lang="en-US"/>
-          </a:p>
-        </p:txBody>
-      </p:sp>
-      <p:sp>
-        <p:nvSpPr>
-          <p:cNvPr id="6" name="Rounded Rectangle 5"/>
-          <p:cNvSpPr/>
-          <p:nvPr/>
-        </p:nvSpPr>
-        <p:spPr>
-          <a:xfrm>
-            <a:off x="2362200" y="381000"/>
-            <a:ext cx="1371600" cy="685800"/>
-          </a:xfrm>
-          <a:prstGeom prst="roundRect">
-            <a:avLst/>
-          </a:prstGeom>
-          <a:solidFill>
-            <a:schemeClr val="accent4"/>
-          </a:solidFill>
-        </p:spPr>
-        <p:style>
-          <a:lnRef idx="1">
-            <a:schemeClr val="accent1"/>
-          </a:lnRef>
-          <a:fillRef idx="3">
-            <a:schemeClr val="accent1"/>
-          </a:fillRef>
-          <a:effectRef idx="2">
-            <a:schemeClr val="accent1"/>
-          </a:effectRef>
-          <a:fontRef idx="minor">
-            <a:schemeClr val="lt1"/>
-          </a:fontRef>
-        </p:style>
-        <p:txBody>
-          <a:bodyPr rtlCol="0" anchor="ctr"/>
-          <a:lstStyle/>
-          <a:p>
-            <a:pPr algn="ctr"/>
-            <a:r>
-              <a:rPr lang="en-US" dirty="0" smtClean="0"/>
-              <a:t>Cyber-</a:t>
-            </a:r>
-            <a:r>
-              <a:rPr lang="en-US" dirty="0" err="1" smtClean="0"/>
-              <a:t>ShARE</a:t>
-            </a:r>
-            <a:endParaRPr lang="en-US" dirty="0"/>
-          </a:p>
-        </p:txBody>
-      </p:sp>
-      <p:sp>
-        <p:nvSpPr>
-          <p:cNvPr id="7" name="TextBox 6"/>
-          <p:cNvSpPr txBox="1"/>
-          <p:nvPr/>
-        </p:nvSpPr>
-        <p:spPr>
-          <a:xfrm>
-            <a:off x="7239000" y="1295400"/>
-            <a:ext cx="1798013" cy="369332"/>
-          </a:xfrm>
-          <a:prstGeom prst="rect">
-            <a:avLst/>
-          </a:prstGeom>
-          <a:noFill/>
-        </p:spPr>
-        <p:txBody>
-          <a:bodyPr wrap="none" rtlCol="0">
-            <a:spAutoFit/>
-          </a:bodyPr>
-          <a:lstStyle/>
-          <a:p>
-            <a:r>
-              <a:rPr lang="en-US" dirty="0" smtClean="0"/>
-              <a:t>WORKING DEMO</a:t>
-            </a:r>
-            <a:endParaRPr lang="en-US" dirty="0"/>
-          </a:p>
-        </p:txBody>
-      </p:sp>
-    </p:spTree>
-    <p:extLst>
-      <p:ext uri="{BB962C8B-B14F-4D97-AF65-F5344CB8AC3E}">
-        <p14:creationId xmlns:p14="http://schemas.microsoft.com/office/powerpoint/2010/main" val="1915867094"/>
-      </p:ext>
-    </p:extLst>
-  </p:cSld>
-  <p:clrMapOvr>
-    <a:masterClrMapping/>
-  </p:clrMapOvr>
-</p:sld>
-</file>
-
-<file path=ppt/slides/slide5.xml><?xml version="1.0" encoding="utf-8"?>
-<p:sld xmlns:a="http://schemas.openxmlformats.org/drawingml/2006/main" xmlns:r="http://schemas.openxmlformats.org/officeDocument/2006/relationships" xmlns:p="http://schemas.openxmlformats.org/presentationml/2006/main">
-  <p:cSld>
-    <p:spTree>
-      <p:nvGrpSpPr>
-        <p:cNvPr id="1" name=""/>
-        <p:cNvGrpSpPr/>
-        <p:nvPr/>
-      </p:nvGrpSpPr>
-      <p:grpSpPr>
-        <a:xfrm>
-          <a:off x="0" y="0"/>
-          <a:ext cx="0" cy="0"/>
-          <a:chOff x="0" y="0"/>
-          <a:chExt cx="0" cy="0"/>
-        </a:xfrm>
-      </p:grpSpPr>
       <p:sp>
         <p:nvSpPr>
           <p:cNvPr id="10" name="Rectangle 9"/>
@@ -10695,7 +7845,7 @@
 </p:sld>
 </file>
 
-<file path=ppt/slides/slide6.xml><?xml version="1.0" encoding="utf-8"?>
+<file path=ppt/slides/slide4.xml><?xml version="1.0" encoding="utf-8"?>
 <p:sld xmlns:a="http://schemas.openxmlformats.org/drawingml/2006/main" xmlns:r="http://schemas.openxmlformats.org/officeDocument/2006/relationships" xmlns:p="http://schemas.openxmlformats.org/presentationml/2006/main">
   <p:cSld>
     <p:spTree>

</xml_diff>